<commit_message>
Add new template and design Board
</commit_message>
<xml_diff>
--- a/designTemplate/DesignTemplate.pptx
+++ b/designTemplate/DesignTemplate.pptx
@@ -9,6 +9,7 @@
     <p:sldId id="259" r:id="rId3"/>
     <p:sldId id="258" r:id="rId4"/>
     <p:sldId id="257" r:id="rId5"/>
+    <p:sldId id="260" r:id="rId6"/>
   </p:sldIdLst>
   <p:sldSz cx="12192000" cy="6858000"/>
   <p:notesSz cx="6858000" cy="9144000"/>
@@ -107,6 +108,11 @@
       </a:defRPr>
     </a:lvl9pPr>
   </p:defaultTextStyle>
+  <p:extLst>
+    <p:ext uri="{EFAFB233-063F-42B5-8137-9DF3F51BA10A}">
+      <p15:sldGuideLst xmlns:p15="http://schemas.microsoft.com/office/powerpoint/2012/main"/>
+    </p:ext>
+  </p:extLst>
 </p:presentation>
 </file>
 
@@ -257,7 +263,7 @@
           <a:p>
             <a:fld id="{BA414528-2103-45F8-AD7F-88AE4D6C82C2}" type="datetimeFigureOut">
               <a:rPr lang="en-US" smtClean="0"/>
-              <a:t>5/7/2023</a:t>
+              <a:t>5/11/2023</a:t>
             </a:fld>
             <a:endParaRPr lang="en-US"/>
           </a:p>
@@ -455,7 +461,7 @@
           <a:p>
             <a:fld id="{BA414528-2103-45F8-AD7F-88AE4D6C82C2}" type="datetimeFigureOut">
               <a:rPr lang="en-US" smtClean="0"/>
-              <a:t>5/7/2023</a:t>
+              <a:t>5/11/2023</a:t>
             </a:fld>
             <a:endParaRPr lang="en-US"/>
           </a:p>
@@ -663,7 +669,7 @@
           <a:p>
             <a:fld id="{BA414528-2103-45F8-AD7F-88AE4D6C82C2}" type="datetimeFigureOut">
               <a:rPr lang="en-US" smtClean="0"/>
-              <a:t>5/7/2023</a:t>
+              <a:t>5/11/2023</a:t>
             </a:fld>
             <a:endParaRPr lang="en-US"/>
           </a:p>
@@ -861,7 +867,7 @@
           <a:p>
             <a:fld id="{BA414528-2103-45F8-AD7F-88AE4D6C82C2}" type="datetimeFigureOut">
               <a:rPr lang="en-US" smtClean="0"/>
-              <a:t>5/7/2023</a:t>
+              <a:t>5/11/2023</a:t>
             </a:fld>
             <a:endParaRPr lang="en-US"/>
           </a:p>
@@ -1136,7 +1142,7 @@
           <a:p>
             <a:fld id="{BA414528-2103-45F8-AD7F-88AE4D6C82C2}" type="datetimeFigureOut">
               <a:rPr lang="en-US" smtClean="0"/>
-              <a:t>5/7/2023</a:t>
+              <a:t>5/11/2023</a:t>
             </a:fld>
             <a:endParaRPr lang="en-US"/>
           </a:p>
@@ -1401,7 +1407,7 @@
           <a:p>
             <a:fld id="{BA414528-2103-45F8-AD7F-88AE4D6C82C2}" type="datetimeFigureOut">
               <a:rPr lang="en-US" smtClean="0"/>
-              <a:t>5/7/2023</a:t>
+              <a:t>5/11/2023</a:t>
             </a:fld>
             <a:endParaRPr lang="en-US"/>
           </a:p>
@@ -1813,7 +1819,7 @@
           <a:p>
             <a:fld id="{BA414528-2103-45F8-AD7F-88AE4D6C82C2}" type="datetimeFigureOut">
               <a:rPr lang="en-US" smtClean="0"/>
-              <a:t>5/7/2023</a:t>
+              <a:t>5/11/2023</a:t>
             </a:fld>
             <a:endParaRPr lang="en-US"/>
           </a:p>
@@ -1954,7 +1960,7 @@
           <a:p>
             <a:fld id="{BA414528-2103-45F8-AD7F-88AE4D6C82C2}" type="datetimeFigureOut">
               <a:rPr lang="en-US" smtClean="0"/>
-              <a:t>5/7/2023</a:t>
+              <a:t>5/11/2023</a:t>
             </a:fld>
             <a:endParaRPr lang="en-US"/>
           </a:p>
@@ -2067,7 +2073,7 @@
           <a:p>
             <a:fld id="{BA414528-2103-45F8-AD7F-88AE4D6C82C2}" type="datetimeFigureOut">
               <a:rPr lang="en-US" smtClean="0"/>
-              <a:t>5/7/2023</a:t>
+              <a:t>5/11/2023</a:t>
             </a:fld>
             <a:endParaRPr lang="en-US"/>
           </a:p>
@@ -2378,7 +2384,7 @@
           <a:p>
             <a:fld id="{BA414528-2103-45F8-AD7F-88AE4D6C82C2}" type="datetimeFigureOut">
               <a:rPr lang="en-US" smtClean="0"/>
-              <a:t>5/7/2023</a:t>
+              <a:t>5/11/2023</a:t>
             </a:fld>
             <a:endParaRPr lang="en-US"/>
           </a:p>
@@ -2666,7 +2672,7 @@
           <a:p>
             <a:fld id="{BA414528-2103-45F8-AD7F-88AE4D6C82C2}" type="datetimeFigureOut">
               <a:rPr lang="en-US" smtClean="0"/>
-              <a:t>5/7/2023</a:t>
+              <a:t>5/11/2023</a:t>
             </a:fld>
             <a:endParaRPr lang="en-US"/>
           </a:p>
@@ -2907,7 +2913,7 @@
           <a:p>
             <a:fld id="{BA414528-2103-45F8-AD7F-88AE4D6C82C2}" type="datetimeFigureOut">
               <a:rPr lang="en-US" smtClean="0"/>
-              <a:t>5/7/2023</a:t>
+              <a:t>5/11/2023</a:t>
             </a:fld>
             <a:endParaRPr lang="en-US"/>
           </a:p>
@@ -4669,6 +4675,94 @@
           </a:prstGeom>
         </p:spPr>
       </p:pic>
+      <p:pic>
+        <p:nvPicPr>
+          <p:cNvPr id="3" name="Picture 2">
+            <a:extLst>
+              <a:ext uri="{FF2B5EF4-FFF2-40B4-BE49-F238E27FC236}">
+                <a16:creationId xmlns:a16="http://schemas.microsoft.com/office/drawing/2014/main" id="{7624B400-3F1F-4B2E-EF01-993A23871058}"/>
+              </a:ext>
+            </a:extLst>
+          </p:cNvPr>
+          <p:cNvPicPr>
+            <a:picLocks noChangeAspect="1"/>
+          </p:cNvPicPr>
+          <p:nvPr/>
+        </p:nvPicPr>
+        <p:blipFill>
+          <a:blip r:embed="rId9">
+            <a:duotone>
+              <a:schemeClr val="accent3">
+                <a:shade val="45000"/>
+                <a:satMod val="135000"/>
+              </a:schemeClr>
+              <a:prstClr val="white"/>
+            </a:duotone>
+            <a:alphaModFix amt="25000"/>
+            <a:extLst>
+              <a:ext uri="{28A0092B-C50C-407E-A947-70E740481C1C}">
+                <a14:useLocalDpi xmlns:a14="http://schemas.microsoft.com/office/drawing/2010/main" val="0"/>
+              </a:ext>
+            </a:extLst>
+          </a:blip>
+          <a:stretch>
+            <a:fillRect/>
+          </a:stretch>
+        </p:blipFill>
+        <p:spPr>
+          <a:xfrm>
+            <a:off x="8956908" y="1298117"/>
+            <a:ext cx="1366396" cy="1373262"/>
+          </a:xfrm>
+          <a:prstGeom prst="rect">
+            <a:avLst/>
+          </a:prstGeom>
+        </p:spPr>
+      </p:pic>
+      <p:pic>
+        <p:nvPicPr>
+          <p:cNvPr id="23" name="Picture 22">
+            <a:extLst>
+              <a:ext uri="{FF2B5EF4-FFF2-40B4-BE49-F238E27FC236}">
+                <a16:creationId xmlns:a16="http://schemas.microsoft.com/office/drawing/2014/main" id="{4BD8EFF3-F54C-02D1-0400-5E90687AB52F}"/>
+              </a:ext>
+            </a:extLst>
+          </p:cNvPr>
+          <p:cNvPicPr>
+            <a:picLocks noChangeAspect="1"/>
+          </p:cNvPicPr>
+          <p:nvPr/>
+        </p:nvPicPr>
+        <p:blipFill>
+          <a:blip r:embed="rId10">
+            <a:alphaModFix amt="25000"/>
+            <a:duotone>
+              <a:schemeClr val="accent3">
+                <a:shade val="45000"/>
+                <a:satMod val="135000"/>
+              </a:schemeClr>
+              <a:prstClr val="white"/>
+            </a:duotone>
+            <a:extLst>
+              <a:ext uri="{28A0092B-C50C-407E-A947-70E740481C1C}">
+                <a14:useLocalDpi xmlns:a14="http://schemas.microsoft.com/office/drawing/2010/main" val="0"/>
+              </a:ext>
+            </a:extLst>
+          </a:blip>
+          <a:stretch>
+            <a:fillRect/>
+          </a:stretch>
+        </p:blipFill>
+        <p:spPr>
+          <a:xfrm>
+            <a:off x="11013857" y="1163613"/>
+            <a:ext cx="575890" cy="561492"/>
+          </a:xfrm>
+          <a:prstGeom prst="rect">
+            <a:avLst/>
+          </a:prstGeom>
+        </p:spPr>
+      </p:pic>
     </p:spTree>
     <p:extLst>
       <p:ext uri="{BB962C8B-B14F-4D97-AF65-F5344CB8AC3E}">
@@ -6038,6 +6132,240 @@
           <a:xfrm>
             <a:off x="10579704" y="2262477"/>
             <a:ext cx="322711" cy="235579"/>
+          </a:xfrm>
+          <a:prstGeom prst="rect">
+            <a:avLst/>
+          </a:prstGeom>
+        </p:spPr>
+      </p:pic>
+      <p:sp>
+        <p:nvSpPr>
+          <p:cNvPr id="2" name="Rectangle: Rounded Corners 1">
+            <a:extLst>
+              <a:ext uri="{FF2B5EF4-FFF2-40B4-BE49-F238E27FC236}">
+                <a16:creationId xmlns:a16="http://schemas.microsoft.com/office/drawing/2014/main" id="{A3FEE91F-99C0-B57C-717F-E45DB9AF0505}"/>
+              </a:ext>
+            </a:extLst>
+          </p:cNvPr>
+          <p:cNvSpPr/>
+          <p:nvPr/>
+        </p:nvSpPr>
+        <p:spPr>
+          <a:xfrm>
+            <a:off x="8917757" y="1055801"/>
+            <a:ext cx="2831773" cy="1581912"/>
+          </a:xfrm>
+          <a:prstGeom prst="roundRect">
+            <a:avLst>
+              <a:gd name="adj" fmla="val 10112"/>
+            </a:avLst>
+          </a:prstGeom>
+          <a:solidFill>
+            <a:srgbClr val="2A2A2A"/>
+          </a:solidFill>
+          <a:ln>
+            <a:noFill/>
+          </a:ln>
+        </p:spPr>
+        <p:style>
+          <a:lnRef idx="2">
+            <a:schemeClr val="accent1">
+              <a:shade val="50000"/>
+            </a:schemeClr>
+          </a:lnRef>
+          <a:fillRef idx="1">
+            <a:schemeClr val="accent1"/>
+          </a:fillRef>
+          <a:effectRef idx="0">
+            <a:schemeClr val="accent1"/>
+          </a:effectRef>
+          <a:fontRef idx="minor">
+            <a:schemeClr val="lt1"/>
+          </a:fontRef>
+        </p:style>
+        <p:txBody>
+          <a:bodyPr rtlCol="0" anchor="ctr"/>
+          <a:lstStyle/>
+          <a:p>
+            <a:pPr algn="ctr"/>
+            <a:r>
+              <a:rPr lang="en-US" dirty="0"/>
+              <a:t> </a:t>
+            </a:r>
+          </a:p>
+        </p:txBody>
+      </p:sp>
+      <p:sp>
+        <p:nvSpPr>
+          <p:cNvPr id="3" name="Rectangle: Rounded Corners 2">
+            <a:extLst>
+              <a:ext uri="{FF2B5EF4-FFF2-40B4-BE49-F238E27FC236}">
+                <a16:creationId xmlns:a16="http://schemas.microsoft.com/office/drawing/2014/main" id="{06BE5008-8EF2-7FD7-6D84-BB79C93BAC36}"/>
+              </a:ext>
+            </a:extLst>
+          </p:cNvPr>
+          <p:cNvSpPr/>
+          <p:nvPr/>
+        </p:nvSpPr>
+        <p:spPr>
+          <a:xfrm>
+            <a:off x="10935762" y="2215298"/>
+            <a:ext cx="752365" cy="329939"/>
+          </a:xfrm>
+          <a:prstGeom prst="roundRect">
+            <a:avLst/>
+          </a:prstGeom>
+          <a:solidFill>
+            <a:schemeClr val="bg1"/>
+          </a:solidFill>
+          <a:ln>
+            <a:noFill/>
+          </a:ln>
+        </p:spPr>
+        <p:style>
+          <a:lnRef idx="2">
+            <a:schemeClr val="accent1">
+              <a:shade val="50000"/>
+            </a:schemeClr>
+          </a:lnRef>
+          <a:fillRef idx="1">
+            <a:schemeClr val="accent1"/>
+          </a:fillRef>
+          <a:effectRef idx="0">
+            <a:schemeClr val="accent1"/>
+          </a:effectRef>
+          <a:fontRef idx="minor">
+            <a:schemeClr val="lt1"/>
+          </a:fontRef>
+        </p:style>
+        <p:txBody>
+          <a:bodyPr rtlCol="0" anchor="ctr"/>
+          <a:lstStyle/>
+          <a:p>
+            <a:pPr algn="ctr"/>
+            <a:endParaRPr lang="en-US"/>
+          </a:p>
+        </p:txBody>
+      </p:sp>
+      <p:pic>
+        <p:nvPicPr>
+          <p:cNvPr id="8" name="Picture 7">
+            <a:extLst>
+              <a:ext uri="{FF2B5EF4-FFF2-40B4-BE49-F238E27FC236}">
+                <a16:creationId xmlns:a16="http://schemas.microsoft.com/office/drawing/2014/main" id="{4F0B55DC-99E7-84EF-8253-94F8A7384EAE}"/>
+              </a:ext>
+            </a:extLst>
+          </p:cNvPr>
+          <p:cNvPicPr>
+            <a:picLocks noChangeAspect="1"/>
+          </p:cNvPicPr>
+          <p:nvPr/>
+        </p:nvPicPr>
+        <p:blipFill>
+          <a:blip r:embed="rId8">
+            <a:lum bright="70000" contrast="-70000"/>
+            <a:extLst>
+              <a:ext uri="{28A0092B-C50C-407E-A947-70E740481C1C}">
+                <a14:useLocalDpi xmlns:a14="http://schemas.microsoft.com/office/drawing/2010/main" val="0"/>
+              </a:ext>
+            </a:extLst>
+          </a:blip>
+          <a:stretch>
+            <a:fillRect/>
+          </a:stretch>
+        </p:blipFill>
+        <p:spPr>
+          <a:xfrm>
+            <a:off x="10579704" y="2262477"/>
+            <a:ext cx="322711" cy="235579"/>
+          </a:xfrm>
+          <a:prstGeom prst="rect">
+            <a:avLst/>
+          </a:prstGeom>
+        </p:spPr>
+      </p:pic>
+      <p:pic>
+        <p:nvPicPr>
+          <p:cNvPr id="23" name="Picture 22">
+            <a:extLst>
+              <a:ext uri="{FF2B5EF4-FFF2-40B4-BE49-F238E27FC236}">
+                <a16:creationId xmlns:a16="http://schemas.microsoft.com/office/drawing/2014/main" id="{A105F562-6B3A-52B8-67F3-F1ED84E00A28}"/>
+              </a:ext>
+            </a:extLst>
+          </p:cNvPr>
+          <p:cNvPicPr>
+            <a:picLocks noChangeAspect="1"/>
+          </p:cNvPicPr>
+          <p:nvPr/>
+        </p:nvPicPr>
+        <p:blipFill>
+          <a:blip r:embed="rId9">
+            <a:duotone>
+              <a:schemeClr val="accent3">
+                <a:shade val="45000"/>
+                <a:satMod val="135000"/>
+              </a:schemeClr>
+              <a:prstClr val="white"/>
+            </a:duotone>
+            <a:alphaModFix amt="25000"/>
+            <a:extLst>
+              <a:ext uri="{28A0092B-C50C-407E-A947-70E740481C1C}">
+                <a14:useLocalDpi xmlns:a14="http://schemas.microsoft.com/office/drawing/2010/main" val="0"/>
+              </a:ext>
+            </a:extLst>
+          </a:blip>
+          <a:stretch>
+            <a:fillRect/>
+          </a:stretch>
+        </p:blipFill>
+        <p:spPr>
+          <a:xfrm>
+            <a:off x="8956908" y="1298117"/>
+            <a:ext cx="1366396" cy="1373262"/>
+          </a:xfrm>
+          <a:prstGeom prst="rect">
+            <a:avLst/>
+          </a:prstGeom>
+        </p:spPr>
+      </p:pic>
+      <p:pic>
+        <p:nvPicPr>
+          <p:cNvPr id="25" name="Picture 24">
+            <a:extLst>
+              <a:ext uri="{FF2B5EF4-FFF2-40B4-BE49-F238E27FC236}">
+                <a16:creationId xmlns:a16="http://schemas.microsoft.com/office/drawing/2014/main" id="{28C85757-3663-7646-C006-D7166712CC72}"/>
+              </a:ext>
+            </a:extLst>
+          </p:cNvPr>
+          <p:cNvPicPr>
+            <a:picLocks noChangeAspect="1"/>
+          </p:cNvPicPr>
+          <p:nvPr/>
+        </p:nvPicPr>
+        <p:blipFill>
+          <a:blip r:embed="rId10">
+            <a:alphaModFix amt="25000"/>
+            <a:duotone>
+              <a:schemeClr val="accent3">
+                <a:shade val="45000"/>
+                <a:satMod val="135000"/>
+              </a:schemeClr>
+              <a:prstClr val="white"/>
+            </a:duotone>
+            <a:extLst>
+              <a:ext uri="{28A0092B-C50C-407E-A947-70E740481C1C}">
+                <a14:useLocalDpi xmlns:a14="http://schemas.microsoft.com/office/drawing/2010/main" val="0"/>
+              </a:ext>
+            </a:extLst>
+          </a:blip>
+          <a:stretch>
+            <a:fillRect/>
+          </a:stretch>
+        </p:blipFill>
+        <p:spPr>
+          <a:xfrm>
+            <a:off x="11013857" y="1163613"/>
+            <a:ext cx="575890" cy="561492"/>
           </a:xfrm>
           <a:prstGeom prst="rect">
             <a:avLst/>
@@ -7419,6 +7747,240 @@
           </a:prstGeom>
         </p:spPr>
       </p:pic>
+      <p:sp>
+        <p:nvSpPr>
+          <p:cNvPr id="2" name="Rectangle: Rounded Corners 1">
+            <a:extLst>
+              <a:ext uri="{FF2B5EF4-FFF2-40B4-BE49-F238E27FC236}">
+                <a16:creationId xmlns:a16="http://schemas.microsoft.com/office/drawing/2014/main" id="{BAE13471-273B-E0D0-F651-0C073BE17D35}"/>
+              </a:ext>
+            </a:extLst>
+          </p:cNvPr>
+          <p:cNvSpPr/>
+          <p:nvPr/>
+        </p:nvSpPr>
+        <p:spPr>
+          <a:xfrm>
+            <a:off x="8917757" y="1055801"/>
+            <a:ext cx="2831773" cy="1581912"/>
+          </a:xfrm>
+          <a:prstGeom prst="roundRect">
+            <a:avLst>
+              <a:gd name="adj" fmla="val 10112"/>
+            </a:avLst>
+          </a:prstGeom>
+          <a:solidFill>
+            <a:srgbClr val="2A2A2A"/>
+          </a:solidFill>
+          <a:ln>
+            <a:noFill/>
+          </a:ln>
+        </p:spPr>
+        <p:style>
+          <a:lnRef idx="2">
+            <a:schemeClr val="accent1">
+              <a:shade val="50000"/>
+            </a:schemeClr>
+          </a:lnRef>
+          <a:fillRef idx="1">
+            <a:schemeClr val="accent1"/>
+          </a:fillRef>
+          <a:effectRef idx="0">
+            <a:schemeClr val="accent1"/>
+          </a:effectRef>
+          <a:fontRef idx="minor">
+            <a:schemeClr val="lt1"/>
+          </a:fontRef>
+        </p:style>
+        <p:txBody>
+          <a:bodyPr rtlCol="0" anchor="ctr"/>
+          <a:lstStyle/>
+          <a:p>
+            <a:pPr algn="ctr"/>
+            <a:r>
+              <a:rPr lang="en-US" dirty="0"/>
+              <a:t> </a:t>
+            </a:r>
+          </a:p>
+        </p:txBody>
+      </p:sp>
+      <p:sp>
+        <p:nvSpPr>
+          <p:cNvPr id="3" name="Rectangle: Rounded Corners 2">
+            <a:extLst>
+              <a:ext uri="{FF2B5EF4-FFF2-40B4-BE49-F238E27FC236}">
+                <a16:creationId xmlns:a16="http://schemas.microsoft.com/office/drawing/2014/main" id="{CF2B9FAC-EBA9-9438-DC59-73ED2FFCBBE5}"/>
+              </a:ext>
+            </a:extLst>
+          </p:cNvPr>
+          <p:cNvSpPr/>
+          <p:nvPr/>
+        </p:nvSpPr>
+        <p:spPr>
+          <a:xfrm>
+            <a:off x="10935762" y="2215298"/>
+            <a:ext cx="752365" cy="329939"/>
+          </a:xfrm>
+          <a:prstGeom prst="roundRect">
+            <a:avLst/>
+          </a:prstGeom>
+          <a:solidFill>
+            <a:schemeClr val="bg1"/>
+          </a:solidFill>
+          <a:ln>
+            <a:noFill/>
+          </a:ln>
+        </p:spPr>
+        <p:style>
+          <a:lnRef idx="2">
+            <a:schemeClr val="accent1">
+              <a:shade val="50000"/>
+            </a:schemeClr>
+          </a:lnRef>
+          <a:fillRef idx="1">
+            <a:schemeClr val="accent1"/>
+          </a:fillRef>
+          <a:effectRef idx="0">
+            <a:schemeClr val="accent1"/>
+          </a:effectRef>
+          <a:fontRef idx="minor">
+            <a:schemeClr val="lt1"/>
+          </a:fontRef>
+        </p:style>
+        <p:txBody>
+          <a:bodyPr rtlCol="0" anchor="ctr"/>
+          <a:lstStyle/>
+          <a:p>
+            <a:pPr algn="ctr"/>
+            <a:endParaRPr lang="en-US"/>
+          </a:p>
+        </p:txBody>
+      </p:sp>
+      <p:pic>
+        <p:nvPicPr>
+          <p:cNvPr id="8" name="Picture 7">
+            <a:extLst>
+              <a:ext uri="{FF2B5EF4-FFF2-40B4-BE49-F238E27FC236}">
+                <a16:creationId xmlns:a16="http://schemas.microsoft.com/office/drawing/2014/main" id="{91B15013-5D0B-690C-7248-91F79C7F607D}"/>
+              </a:ext>
+            </a:extLst>
+          </p:cNvPr>
+          <p:cNvPicPr>
+            <a:picLocks noChangeAspect="1"/>
+          </p:cNvPicPr>
+          <p:nvPr/>
+        </p:nvPicPr>
+        <p:blipFill>
+          <a:blip r:embed="rId8">
+            <a:lum bright="70000" contrast="-70000"/>
+            <a:extLst>
+              <a:ext uri="{28A0092B-C50C-407E-A947-70E740481C1C}">
+                <a14:useLocalDpi xmlns:a14="http://schemas.microsoft.com/office/drawing/2010/main" val="0"/>
+              </a:ext>
+            </a:extLst>
+          </a:blip>
+          <a:stretch>
+            <a:fillRect/>
+          </a:stretch>
+        </p:blipFill>
+        <p:spPr>
+          <a:xfrm>
+            <a:off x="10579704" y="2262477"/>
+            <a:ext cx="322711" cy="235579"/>
+          </a:xfrm>
+          <a:prstGeom prst="rect">
+            <a:avLst/>
+          </a:prstGeom>
+        </p:spPr>
+      </p:pic>
+      <p:pic>
+        <p:nvPicPr>
+          <p:cNvPr id="23" name="Picture 22">
+            <a:extLst>
+              <a:ext uri="{FF2B5EF4-FFF2-40B4-BE49-F238E27FC236}">
+                <a16:creationId xmlns:a16="http://schemas.microsoft.com/office/drawing/2014/main" id="{5B5FFDAE-3E8E-6CF4-B263-3359FF84383E}"/>
+              </a:ext>
+            </a:extLst>
+          </p:cNvPr>
+          <p:cNvPicPr>
+            <a:picLocks noChangeAspect="1"/>
+          </p:cNvPicPr>
+          <p:nvPr/>
+        </p:nvPicPr>
+        <p:blipFill>
+          <a:blip r:embed="rId9">
+            <a:duotone>
+              <a:schemeClr val="accent3">
+                <a:shade val="45000"/>
+                <a:satMod val="135000"/>
+              </a:schemeClr>
+              <a:prstClr val="white"/>
+            </a:duotone>
+            <a:alphaModFix amt="25000"/>
+            <a:extLst>
+              <a:ext uri="{28A0092B-C50C-407E-A947-70E740481C1C}">
+                <a14:useLocalDpi xmlns:a14="http://schemas.microsoft.com/office/drawing/2010/main" val="0"/>
+              </a:ext>
+            </a:extLst>
+          </a:blip>
+          <a:stretch>
+            <a:fillRect/>
+          </a:stretch>
+        </p:blipFill>
+        <p:spPr>
+          <a:xfrm>
+            <a:off x="8956908" y="1298117"/>
+            <a:ext cx="1366396" cy="1373262"/>
+          </a:xfrm>
+          <a:prstGeom prst="rect">
+            <a:avLst/>
+          </a:prstGeom>
+        </p:spPr>
+      </p:pic>
+      <p:pic>
+        <p:nvPicPr>
+          <p:cNvPr id="25" name="Picture 24">
+            <a:extLst>
+              <a:ext uri="{FF2B5EF4-FFF2-40B4-BE49-F238E27FC236}">
+                <a16:creationId xmlns:a16="http://schemas.microsoft.com/office/drawing/2014/main" id="{4B892DBF-C291-0B93-0AD6-5448B02DDCDE}"/>
+              </a:ext>
+            </a:extLst>
+          </p:cNvPr>
+          <p:cNvPicPr>
+            <a:picLocks noChangeAspect="1"/>
+          </p:cNvPicPr>
+          <p:nvPr/>
+        </p:nvPicPr>
+        <p:blipFill>
+          <a:blip r:embed="rId10">
+            <a:alphaModFix amt="25000"/>
+            <a:duotone>
+              <a:schemeClr val="accent3">
+                <a:shade val="45000"/>
+                <a:satMod val="135000"/>
+              </a:schemeClr>
+              <a:prstClr val="white"/>
+            </a:duotone>
+            <a:extLst>
+              <a:ext uri="{28A0092B-C50C-407E-A947-70E740481C1C}">
+                <a14:useLocalDpi xmlns:a14="http://schemas.microsoft.com/office/drawing/2010/main" val="0"/>
+              </a:ext>
+            </a:extLst>
+          </a:blip>
+          <a:stretch>
+            <a:fillRect/>
+          </a:stretch>
+        </p:blipFill>
+        <p:spPr>
+          <a:xfrm>
+            <a:off x="11013857" y="1163613"/>
+            <a:ext cx="575890" cy="561492"/>
+          </a:xfrm>
+          <a:prstGeom prst="rect">
+            <a:avLst/>
+          </a:prstGeom>
+        </p:spPr>
+      </p:pic>
     </p:spTree>
     <p:extLst>
       <p:ext uri="{BB962C8B-B14F-4D97-AF65-F5344CB8AC3E}">
@@ -8794,10 +9356,1229 @@
           </a:prstGeom>
         </p:spPr>
       </p:pic>
+      <p:sp>
+        <p:nvSpPr>
+          <p:cNvPr id="2" name="Rectangle: Rounded Corners 1">
+            <a:extLst>
+              <a:ext uri="{FF2B5EF4-FFF2-40B4-BE49-F238E27FC236}">
+                <a16:creationId xmlns:a16="http://schemas.microsoft.com/office/drawing/2014/main" id="{0386221D-D667-E624-190A-833334F46E4A}"/>
+              </a:ext>
+            </a:extLst>
+          </p:cNvPr>
+          <p:cNvSpPr/>
+          <p:nvPr/>
+        </p:nvSpPr>
+        <p:spPr>
+          <a:xfrm>
+            <a:off x="8917757" y="1055801"/>
+            <a:ext cx="2831773" cy="1581912"/>
+          </a:xfrm>
+          <a:prstGeom prst="roundRect">
+            <a:avLst>
+              <a:gd name="adj" fmla="val 10112"/>
+            </a:avLst>
+          </a:prstGeom>
+          <a:solidFill>
+            <a:srgbClr val="2A2A2A"/>
+          </a:solidFill>
+          <a:ln>
+            <a:noFill/>
+          </a:ln>
+        </p:spPr>
+        <p:style>
+          <a:lnRef idx="2">
+            <a:schemeClr val="accent1">
+              <a:shade val="50000"/>
+            </a:schemeClr>
+          </a:lnRef>
+          <a:fillRef idx="1">
+            <a:schemeClr val="accent1"/>
+          </a:fillRef>
+          <a:effectRef idx="0">
+            <a:schemeClr val="accent1"/>
+          </a:effectRef>
+          <a:fontRef idx="minor">
+            <a:schemeClr val="lt1"/>
+          </a:fontRef>
+        </p:style>
+        <p:txBody>
+          <a:bodyPr rtlCol="0" anchor="ctr"/>
+          <a:lstStyle/>
+          <a:p>
+            <a:pPr algn="ctr"/>
+            <a:r>
+              <a:rPr lang="en-US" dirty="0"/>
+              <a:t> </a:t>
+            </a:r>
+          </a:p>
+        </p:txBody>
+      </p:sp>
+      <p:sp>
+        <p:nvSpPr>
+          <p:cNvPr id="3" name="Rectangle: Rounded Corners 2">
+            <a:extLst>
+              <a:ext uri="{FF2B5EF4-FFF2-40B4-BE49-F238E27FC236}">
+                <a16:creationId xmlns:a16="http://schemas.microsoft.com/office/drawing/2014/main" id="{E55BAC02-B084-0FC1-313F-8F862BAAA8C1}"/>
+              </a:ext>
+            </a:extLst>
+          </p:cNvPr>
+          <p:cNvSpPr/>
+          <p:nvPr/>
+        </p:nvSpPr>
+        <p:spPr>
+          <a:xfrm>
+            <a:off x="10935762" y="2215298"/>
+            <a:ext cx="752365" cy="329939"/>
+          </a:xfrm>
+          <a:prstGeom prst="roundRect">
+            <a:avLst/>
+          </a:prstGeom>
+          <a:solidFill>
+            <a:schemeClr val="bg1"/>
+          </a:solidFill>
+          <a:ln>
+            <a:noFill/>
+          </a:ln>
+        </p:spPr>
+        <p:style>
+          <a:lnRef idx="2">
+            <a:schemeClr val="accent1">
+              <a:shade val="50000"/>
+            </a:schemeClr>
+          </a:lnRef>
+          <a:fillRef idx="1">
+            <a:schemeClr val="accent1"/>
+          </a:fillRef>
+          <a:effectRef idx="0">
+            <a:schemeClr val="accent1"/>
+          </a:effectRef>
+          <a:fontRef idx="minor">
+            <a:schemeClr val="lt1"/>
+          </a:fontRef>
+        </p:style>
+        <p:txBody>
+          <a:bodyPr rtlCol="0" anchor="ctr"/>
+          <a:lstStyle/>
+          <a:p>
+            <a:pPr algn="ctr"/>
+            <a:endParaRPr lang="en-US"/>
+          </a:p>
+        </p:txBody>
+      </p:sp>
+      <p:pic>
+        <p:nvPicPr>
+          <p:cNvPr id="8" name="Picture 7">
+            <a:extLst>
+              <a:ext uri="{FF2B5EF4-FFF2-40B4-BE49-F238E27FC236}">
+                <a16:creationId xmlns:a16="http://schemas.microsoft.com/office/drawing/2014/main" id="{63F9846D-FDC9-28EC-AAE5-239120A0ABEA}"/>
+              </a:ext>
+            </a:extLst>
+          </p:cNvPr>
+          <p:cNvPicPr>
+            <a:picLocks noChangeAspect="1"/>
+          </p:cNvPicPr>
+          <p:nvPr/>
+        </p:nvPicPr>
+        <p:blipFill>
+          <a:blip r:embed="rId8">
+            <a:lum bright="70000" contrast="-70000"/>
+            <a:extLst>
+              <a:ext uri="{28A0092B-C50C-407E-A947-70E740481C1C}">
+                <a14:useLocalDpi xmlns:a14="http://schemas.microsoft.com/office/drawing/2010/main" val="0"/>
+              </a:ext>
+            </a:extLst>
+          </a:blip>
+          <a:stretch>
+            <a:fillRect/>
+          </a:stretch>
+        </p:blipFill>
+        <p:spPr>
+          <a:xfrm>
+            <a:off x="10579704" y="2262477"/>
+            <a:ext cx="322711" cy="235579"/>
+          </a:xfrm>
+          <a:prstGeom prst="rect">
+            <a:avLst/>
+          </a:prstGeom>
+        </p:spPr>
+      </p:pic>
+      <p:pic>
+        <p:nvPicPr>
+          <p:cNvPr id="23" name="Picture 22">
+            <a:extLst>
+              <a:ext uri="{FF2B5EF4-FFF2-40B4-BE49-F238E27FC236}">
+                <a16:creationId xmlns:a16="http://schemas.microsoft.com/office/drawing/2014/main" id="{4C0C9D8A-EF75-8A22-3730-C6FCC646EC6A}"/>
+              </a:ext>
+            </a:extLst>
+          </p:cNvPr>
+          <p:cNvPicPr>
+            <a:picLocks noChangeAspect="1"/>
+          </p:cNvPicPr>
+          <p:nvPr/>
+        </p:nvPicPr>
+        <p:blipFill>
+          <a:blip r:embed="rId9">
+            <a:duotone>
+              <a:schemeClr val="accent3">
+                <a:shade val="45000"/>
+                <a:satMod val="135000"/>
+              </a:schemeClr>
+              <a:prstClr val="white"/>
+            </a:duotone>
+            <a:alphaModFix amt="25000"/>
+            <a:extLst>
+              <a:ext uri="{28A0092B-C50C-407E-A947-70E740481C1C}">
+                <a14:useLocalDpi xmlns:a14="http://schemas.microsoft.com/office/drawing/2010/main" val="0"/>
+              </a:ext>
+            </a:extLst>
+          </a:blip>
+          <a:stretch>
+            <a:fillRect/>
+          </a:stretch>
+        </p:blipFill>
+        <p:spPr>
+          <a:xfrm>
+            <a:off x="8956908" y="1298117"/>
+            <a:ext cx="1366396" cy="1373262"/>
+          </a:xfrm>
+          <a:prstGeom prst="rect">
+            <a:avLst/>
+          </a:prstGeom>
+        </p:spPr>
+      </p:pic>
+      <p:pic>
+        <p:nvPicPr>
+          <p:cNvPr id="25" name="Picture 24">
+            <a:extLst>
+              <a:ext uri="{FF2B5EF4-FFF2-40B4-BE49-F238E27FC236}">
+                <a16:creationId xmlns:a16="http://schemas.microsoft.com/office/drawing/2014/main" id="{5E0F73A9-CEF0-73B8-A92B-E050629C4CD1}"/>
+              </a:ext>
+            </a:extLst>
+          </p:cNvPr>
+          <p:cNvPicPr>
+            <a:picLocks noChangeAspect="1"/>
+          </p:cNvPicPr>
+          <p:nvPr/>
+        </p:nvPicPr>
+        <p:blipFill>
+          <a:blip r:embed="rId10">
+            <a:alphaModFix amt="25000"/>
+            <a:duotone>
+              <a:schemeClr val="accent3">
+                <a:shade val="45000"/>
+                <a:satMod val="135000"/>
+              </a:schemeClr>
+              <a:prstClr val="white"/>
+            </a:duotone>
+            <a:extLst>
+              <a:ext uri="{28A0092B-C50C-407E-A947-70E740481C1C}">
+                <a14:useLocalDpi xmlns:a14="http://schemas.microsoft.com/office/drawing/2010/main" val="0"/>
+              </a:ext>
+            </a:extLst>
+          </a:blip>
+          <a:stretch>
+            <a:fillRect/>
+          </a:stretch>
+        </p:blipFill>
+        <p:spPr>
+          <a:xfrm>
+            <a:off x="11013857" y="1163613"/>
+            <a:ext cx="575890" cy="561492"/>
+          </a:xfrm>
+          <a:prstGeom prst="rect">
+            <a:avLst/>
+          </a:prstGeom>
+        </p:spPr>
+      </p:pic>
     </p:spTree>
     <p:extLst>
       <p:ext uri="{BB962C8B-B14F-4D97-AF65-F5344CB8AC3E}">
         <p14:creationId xmlns:p14="http://schemas.microsoft.com/office/powerpoint/2010/main" val="3729891469"/>
+      </p:ext>
+    </p:extLst>
+  </p:cSld>
+  <p:clrMapOvr>
+    <a:masterClrMapping/>
+  </p:clrMapOvr>
+</p:sld>
+</file>
+
+<file path=ppt/slides/slide5.xml><?xml version="1.0" encoding="utf-8"?>
+<p:sld xmlns:a="http://schemas.openxmlformats.org/drawingml/2006/main" xmlns:r="http://schemas.openxmlformats.org/officeDocument/2006/relationships" xmlns:p="http://schemas.openxmlformats.org/presentationml/2006/main">
+  <p:cSld>
+    <p:spTree>
+      <p:nvGrpSpPr>
+        <p:cNvPr id="1" name=""/>
+        <p:cNvGrpSpPr/>
+        <p:nvPr/>
+      </p:nvGrpSpPr>
+      <p:grpSpPr>
+        <a:xfrm>
+          <a:off x="0" y="0"/>
+          <a:ext cx="0" cy="0"/>
+          <a:chOff x="0" y="0"/>
+          <a:chExt cx="0" cy="0"/>
+        </a:xfrm>
+      </p:grpSpPr>
+      <p:sp>
+        <p:nvSpPr>
+          <p:cNvPr id="6" name="Rectangle: Rounded Corners 5">
+            <a:extLst>
+              <a:ext uri="{FF2B5EF4-FFF2-40B4-BE49-F238E27FC236}">
+                <a16:creationId xmlns:a16="http://schemas.microsoft.com/office/drawing/2014/main" id="{DAB6FAD9-6C33-8EE0-80E9-41FB03C88FCE}"/>
+              </a:ext>
+            </a:extLst>
+          </p:cNvPr>
+          <p:cNvSpPr/>
+          <p:nvPr/>
+        </p:nvSpPr>
+        <p:spPr>
+          <a:xfrm>
+            <a:off x="3238460" y="69008"/>
+            <a:ext cx="8893154" cy="6711354"/>
+          </a:xfrm>
+          <a:prstGeom prst="roundRect">
+            <a:avLst>
+              <a:gd name="adj" fmla="val 4170"/>
+            </a:avLst>
+          </a:prstGeom>
+          <a:solidFill>
+            <a:srgbClr val="F0F2F7"/>
+          </a:solidFill>
+          <a:ln>
+            <a:noFill/>
+          </a:ln>
+        </p:spPr>
+        <p:style>
+          <a:lnRef idx="2">
+            <a:schemeClr val="accent1">
+              <a:shade val="50000"/>
+            </a:schemeClr>
+          </a:lnRef>
+          <a:fillRef idx="1">
+            <a:schemeClr val="accent1"/>
+          </a:fillRef>
+          <a:effectRef idx="0">
+            <a:schemeClr val="accent1"/>
+          </a:effectRef>
+          <a:fontRef idx="minor">
+            <a:schemeClr val="lt1"/>
+          </a:fontRef>
+        </p:style>
+        <p:txBody>
+          <a:bodyPr rtlCol="0" anchor="ctr"/>
+          <a:lstStyle/>
+          <a:p>
+            <a:pPr algn="ctr"/>
+            <a:endParaRPr lang="en-US"/>
+          </a:p>
+        </p:txBody>
+      </p:sp>
+      <p:sp>
+        <p:nvSpPr>
+          <p:cNvPr id="4" name="Rectangle: Rounded Corners 3">
+            <a:extLst>
+              <a:ext uri="{FF2B5EF4-FFF2-40B4-BE49-F238E27FC236}">
+                <a16:creationId xmlns:a16="http://schemas.microsoft.com/office/drawing/2014/main" id="{4AEF2B08-87B3-6E70-7C20-5E84A33634C6}"/>
+              </a:ext>
+            </a:extLst>
+          </p:cNvPr>
+          <p:cNvSpPr/>
+          <p:nvPr/>
+        </p:nvSpPr>
+        <p:spPr>
+          <a:xfrm>
+            <a:off x="60386" y="69008"/>
+            <a:ext cx="3520440" cy="6711354"/>
+          </a:xfrm>
+          <a:prstGeom prst="roundRect">
+            <a:avLst>
+              <a:gd name="adj" fmla="val 4170"/>
+            </a:avLst>
+          </a:prstGeom>
+          <a:solidFill>
+            <a:srgbClr val="414141"/>
+          </a:solidFill>
+          <a:ln>
+            <a:noFill/>
+          </a:ln>
+        </p:spPr>
+        <p:style>
+          <a:lnRef idx="2">
+            <a:schemeClr val="accent1">
+              <a:shade val="50000"/>
+            </a:schemeClr>
+          </a:lnRef>
+          <a:fillRef idx="1">
+            <a:schemeClr val="accent1"/>
+          </a:fillRef>
+          <a:effectRef idx="0">
+            <a:schemeClr val="accent1"/>
+          </a:effectRef>
+          <a:fontRef idx="minor">
+            <a:schemeClr val="lt1"/>
+          </a:fontRef>
+        </p:style>
+        <p:txBody>
+          <a:bodyPr rtlCol="0" anchor="ctr"/>
+          <a:lstStyle/>
+          <a:p>
+            <a:pPr algn="ctr"/>
+            <a:endParaRPr lang="en-US"/>
+          </a:p>
+        </p:txBody>
+      </p:sp>
+      <p:sp>
+        <p:nvSpPr>
+          <p:cNvPr id="5" name="Rectangle: Rounded Corners 4">
+            <a:extLst>
+              <a:ext uri="{FF2B5EF4-FFF2-40B4-BE49-F238E27FC236}">
+                <a16:creationId xmlns:a16="http://schemas.microsoft.com/office/drawing/2014/main" id="{20ABCE78-0E65-BAF5-2D27-55703775FD78}"/>
+              </a:ext>
+            </a:extLst>
+          </p:cNvPr>
+          <p:cNvSpPr/>
+          <p:nvPr/>
+        </p:nvSpPr>
+        <p:spPr>
+          <a:xfrm>
+            <a:off x="208214" y="247145"/>
+            <a:ext cx="2514600" cy="6355080"/>
+          </a:xfrm>
+          <a:prstGeom prst="roundRect">
+            <a:avLst>
+              <a:gd name="adj" fmla="val 4170"/>
+            </a:avLst>
+          </a:prstGeom>
+          <a:solidFill>
+            <a:srgbClr val="2A2A2A"/>
+          </a:solidFill>
+          <a:ln>
+            <a:noFill/>
+          </a:ln>
+        </p:spPr>
+        <p:style>
+          <a:lnRef idx="2">
+            <a:schemeClr val="accent1">
+              <a:shade val="50000"/>
+            </a:schemeClr>
+          </a:lnRef>
+          <a:fillRef idx="1">
+            <a:schemeClr val="accent1"/>
+          </a:fillRef>
+          <a:effectRef idx="0">
+            <a:schemeClr val="accent1"/>
+          </a:effectRef>
+          <a:fontRef idx="minor">
+            <a:schemeClr val="lt1"/>
+          </a:fontRef>
+        </p:style>
+        <p:txBody>
+          <a:bodyPr rtlCol="0" anchor="ctr"/>
+          <a:lstStyle/>
+          <a:p>
+            <a:pPr algn="ctr"/>
+            <a:endParaRPr lang="en-US" dirty="0"/>
+          </a:p>
+        </p:txBody>
+      </p:sp>
+      <p:sp>
+        <p:nvSpPr>
+          <p:cNvPr id="7" name="Rectangle: Rounded Corners 6">
+            <a:extLst>
+              <a:ext uri="{FF2B5EF4-FFF2-40B4-BE49-F238E27FC236}">
+                <a16:creationId xmlns:a16="http://schemas.microsoft.com/office/drawing/2014/main" id="{21B0A15A-7600-11EC-F6CB-E89C8202B8E1}"/>
+              </a:ext>
+            </a:extLst>
+          </p:cNvPr>
+          <p:cNvSpPr/>
+          <p:nvPr/>
+        </p:nvSpPr>
+        <p:spPr>
+          <a:xfrm>
+            <a:off x="2637971" y="255775"/>
+            <a:ext cx="9260972" cy="6355080"/>
+          </a:xfrm>
+          <a:prstGeom prst="roundRect">
+            <a:avLst>
+              <a:gd name="adj" fmla="val 0"/>
+            </a:avLst>
+          </a:prstGeom>
+          <a:solidFill>
+            <a:schemeClr val="bg1"/>
+          </a:solidFill>
+          <a:ln>
+            <a:noFill/>
+          </a:ln>
+        </p:spPr>
+        <p:style>
+          <a:lnRef idx="2">
+            <a:schemeClr val="accent1">
+              <a:shade val="50000"/>
+            </a:schemeClr>
+          </a:lnRef>
+          <a:fillRef idx="1">
+            <a:schemeClr val="accent1"/>
+          </a:fillRef>
+          <a:effectRef idx="0">
+            <a:schemeClr val="accent1"/>
+          </a:effectRef>
+          <a:fontRef idx="minor">
+            <a:schemeClr val="lt1"/>
+          </a:fontRef>
+        </p:style>
+        <p:txBody>
+          <a:bodyPr rtlCol="0" anchor="ctr"/>
+          <a:lstStyle/>
+          <a:p>
+            <a:pPr algn="ctr"/>
+            <a:endParaRPr lang="en-US" dirty="0"/>
+          </a:p>
+        </p:txBody>
+      </p:sp>
+      <p:sp>
+        <p:nvSpPr>
+          <p:cNvPr id="10" name="Rectangle: Rounded Corners 9">
+            <a:extLst>
+              <a:ext uri="{FF2B5EF4-FFF2-40B4-BE49-F238E27FC236}">
+                <a16:creationId xmlns:a16="http://schemas.microsoft.com/office/drawing/2014/main" id="{9A8C4F0C-6AB0-AF8D-24FD-B5152F40A5BB}"/>
+              </a:ext>
+            </a:extLst>
+          </p:cNvPr>
+          <p:cNvSpPr/>
+          <p:nvPr/>
+        </p:nvSpPr>
+        <p:spPr>
+          <a:xfrm>
+            <a:off x="2839171" y="477786"/>
+            <a:ext cx="5783734" cy="347472"/>
+          </a:xfrm>
+          <a:prstGeom prst="roundRect">
+            <a:avLst/>
+          </a:prstGeom>
+          <a:solidFill>
+            <a:srgbClr val="F0F2F7"/>
+          </a:solidFill>
+          <a:ln>
+            <a:noFill/>
+          </a:ln>
+        </p:spPr>
+        <p:style>
+          <a:lnRef idx="2">
+            <a:schemeClr val="accent1">
+              <a:shade val="50000"/>
+            </a:schemeClr>
+          </a:lnRef>
+          <a:fillRef idx="1">
+            <a:schemeClr val="accent1"/>
+          </a:fillRef>
+          <a:effectRef idx="0">
+            <a:schemeClr val="accent1"/>
+          </a:effectRef>
+          <a:fontRef idx="minor">
+            <a:schemeClr val="lt1"/>
+          </a:fontRef>
+        </p:style>
+        <p:txBody>
+          <a:bodyPr rtlCol="0" anchor="ctr"/>
+          <a:lstStyle/>
+          <a:p>
+            <a:pPr algn="ctr"/>
+            <a:endParaRPr lang="en-US"/>
+          </a:p>
+        </p:txBody>
+      </p:sp>
+      <p:sp>
+        <p:nvSpPr>
+          <p:cNvPr id="11" name="Rectangle: Rounded Corners 10">
+            <a:extLst>
+              <a:ext uri="{FF2B5EF4-FFF2-40B4-BE49-F238E27FC236}">
+                <a16:creationId xmlns:a16="http://schemas.microsoft.com/office/drawing/2014/main" id="{EAB843C2-15C0-7F16-47C0-FD35483EA446}"/>
+              </a:ext>
+            </a:extLst>
+          </p:cNvPr>
+          <p:cNvSpPr/>
+          <p:nvPr/>
+        </p:nvSpPr>
+        <p:spPr>
+          <a:xfrm>
+            <a:off x="2870642" y="1103979"/>
+            <a:ext cx="1216152" cy="1581912"/>
+          </a:xfrm>
+          <a:prstGeom prst="roundRect">
+            <a:avLst/>
+          </a:prstGeom>
+          <a:solidFill>
+            <a:srgbClr val="D45C5C"/>
+          </a:solidFill>
+          <a:ln>
+            <a:noFill/>
+          </a:ln>
+        </p:spPr>
+        <p:style>
+          <a:lnRef idx="2">
+            <a:schemeClr val="accent1">
+              <a:shade val="50000"/>
+            </a:schemeClr>
+          </a:lnRef>
+          <a:fillRef idx="1">
+            <a:schemeClr val="accent1"/>
+          </a:fillRef>
+          <a:effectRef idx="0">
+            <a:schemeClr val="accent1"/>
+          </a:effectRef>
+          <a:fontRef idx="minor">
+            <a:schemeClr val="lt1"/>
+          </a:fontRef>
+        </p:style>
+        <p:txBody>
+          <a:bodyPr rtlCol="0" anchor="ctr"/>
+          <a:lstStyle/>
+          <a:p>
+            <a:pPr algn="ctr"/>
+            <a:endParaRPr lang="en-US"/>
+          </a:p>
+        </p:txBody>
+      </p:sp>
+      <p:sp>
+        <p:nvSpPr>
+          <p:cNvPr id="12" name="Rectangle: Rounded Corners 11">
+            <a:extLst>
+              <a:ext uri="{FF2B5EF4-FFF2-40B4-BE49-F238E27FC236}">
+                <a16:creationId xmlns:a16="http://schemas.microsoft.com/office/drawing/2014/main" id="{B6DA3610-960F-D4F0-2A83-18D314EEF978}"/>
+              </a:ext>
+            </a:extLst>
+          </p:cNvPr>
+          <p:cNvSpPr/>
+          <p:nvPr/>
+        </p:nvSpPr>
+        <p:spPr>
+          <a:xfrm>
+            <a:off x="4382679" y="1103979"/>
+            <a:ext cx="1216152" cy="1581912"/>
+          </a:xfrm>
+          <a:prstGeom prst="roundRect">
+            <a:avLst/>
+          </a:prstGeom>
+          <a:solidFill>
+            <a:srgbClr val="F0F2F7"/>
+          </a:solidFill>
+          <a:ln>
+            <a:noFill/>
+          </a:ln>
+        </p:spPr>
+        <p:style>
+          <a:lnRef idx="2">
+            <a:schemeClr val="accent1">
+              <a:shade val="50000"/>
+            </a:schemeClr>
+          </a:lnRef>
+          <a:fillRef idx="1">
+            <a:schemeClr val="accent1"/>
+          </a:fillRef>
+          <a:effectRef idx="0">
+            <a:schemeClr val="accent1"/>
+          </a:effectRef>
+          <a:fontRef idx="minor">
+            <a:schemeClr val="lt1"/>
+          </a:fontRef>
+        </p:style>
+        <p:txBody>
+          <a:bodyPr rtlCol="0" anchor="ctr"/>
+          <a:lstStyle/>
+          <a:p>
+            <a:pPr algn="ctr"/>
+            <a:r>
+              <a:rPr lang="en-US" dirty="0"/>
+              <a:t> </a:t>
+            </a:r>
+          </a:p>
+        </p:txBody>
+      </p:sp>
+      <p:sp>
+        <p:nvSpPr>
+          <p:cNvPr id="13" name="Rectangle: Rounded Corners 12">
+            <a:extLst>
+              <a:ext uri="{FF2B5EF4-FFF2-40B4-BE49-F238E27FC236}">
+                <a16:creationId xmlns:a16="http://schemas.microsoft.com/office/drawing/2014/main" id="{8CE7C166-4CC3-C4A3-840E-2310329486A2}"/>
+              </a:ext>
+            </a:extLst>
+          </p:cNvPr>
+          <p:cNvSpPr/>
+          <p:nvPr/>
+        </p:nvSpPr>
+        <p:spPr>
+          <a:xfrm>
+            <a:off x="5894716" y="1103979"/>
+            <a:ext cx="1216152" cy="1581912"/>
+          </a:xfrm>
+          <a:prstGeom prst="roundRect">
+            <a:avLst/>
+          </a:prstGeom>
+          <a:solidFill>
+            <a:srgbClr val="D45C5C">
+              <a:alpha val="60000"/>
+            </a:srgbClr>
+          </a:solidFill>
+          <a:ln>
+            <a:noFill/>
+          </a:ln>
+        </p:spPr>
+        <p:style>
+          <a:lnRef idx="2">
+            <a:schemeClr val="accent1">
+              <a:shade val="50000"/>
+            </a:schemeClr>
+          </a:lnRef>
+          <a:fillRef idx="1">
+            <a:schemeClr val="accent1"/>
+          </a:fillRef>
+          <a:effectRef idx="0">
+            <a:schemeClr val="accent1"/>
+          </a:effectRef>
+          <a:fontRef idx="minor">
+            <a:schemeClr val="lt1"/>
+          </a:fontRef>
+        </p:style>
+        <p:txBody>
+          <a:bodyPr rtlCol="0" anchor="ctr"/>
+          <a:lstStyle/>
+          <a:p>
+            <a:pPr algn="ctr"/>
+            <a:r>
+              <a:rPr lang="en-US" dirty="0"/>
+              <a:t> </a:t>
+            </a:r>
+          </a:p>
+        </p:txBody>
+      </p:sp>
+      <p:sp>
+        <p:nvSpPr>
+          <p:cNvPr id="15" name="Rectangle: Rounded Corners 14">
+            <a:extLst>
+              <a:ext uri="{FF2B5EF4-FFF2-40B4-BE49-F238E27FC236}">
+                <a16:creationId xmlns:a16="http://schemas.microsoft.com/office/drawing/2014/main" id="{D9F265E6-0E9F-BD0E-F2E3-6BDBF7281E67}"/>
+              </a:ext>
+            </a:extLst>
+          </p:cNvPr>
+          <p:cNvSpPr/>
+          <p:nvPr/>
+        </p:nvSpPr>
+        <p:spPr>
+          <a:xfrm>
+            <a:off x="2904457" y="2964612"/>
+            <a:ext cx="4206411" cy="3415602"/>
+          </a:xfrm>
+          <a:prstGeom prst="roundRect">
+            <a:avLst>
+              <a:gd name="adj" fmla="val 3971"/>
+            </a:avLst>
+          </a:prstGeom>
+          <a:solidFill>
+            <a:srgbClr val="F0F2F7">
+              <a:alpha val="45000"/>
+            </a:srgbClr>
+          </a:solidFill>
+          <a:ln>
+            <a:noFill/>
+          </a:ln>
+        </p:spPr>
+        <p:style>
+          <a:lnRef idx="2">
+            <a:schemeClr val="accent1">
+              <a:shade val="50000"/>
+            </a:schemeClr>
+          </a:lnRef>
+          <a:fillRef idx="1">
+            <a:schemeClr val="accent1"/>
+          </a:fillRef>
+          <a:effectRef idx="0">
+            <a:schemeClr val="accent1"/>
+          </a:effectRef>
+          <a:fontRef idx="minor">
+            <a:schemeClr val="lt1"/>
+          </a:fontRef>
+        </p:style>
+        <p:txBody>
+          <a:bodyPr rtlCol="0" anchor="ctr"/>
+          <a:lstStyle/>
+          <a:p>
+            <a:pPr algn="ctr"/>
+            <a:r>
+              <a:rPr lang="en-US" dirty="0"/>
+              <a:t> </a:t>
+            </a:r>
+          </a:p>
+        </p:txBody>
+      </p:sp>
+      <p:sp>
+        <p:nvSpPr>
+          <p:cNvPr id="16" name="Rectangle: Rounded Corners 15">
+            <a:extLst>
+              <a:ext uri="{FF2B5EF4-FFF2-40B4-BE49-F238E27FC236}">
+                <a16:creationId xmlns:a16="http://schemas.microsoft.com/office/drawing/2014/main" id="{C1625CF7-E99D-6BD7-9E06-A4ECBD9E1B95}"/>
+              </a:ext>
+            </a:extLst>
+          </p:cNvPr>
+          <p:cNvSpPr/>
+          <p:nvPr/>
+        </p:nvSpPr>
+        <p:spPr>
+          <a:xfrm>
+            <a:off x="7406753" y="1055801"/>
+            <a:ext cx="4342777" cy="1581912"/>
+          </a:xfrm>
+          <a:prstGeom prst="roundRect">
+            <a:avLst>
+              <a:gd name="adj" fmla="val 10112"/>
+            </a:avLst>
+          </a:prstGeom>
+          <a:solidFill>
+            <a:srgbClr val="F0F2F7">
+              <a:alpha val="45000"/>
+            </a:srgbClr>
+          </a:solidFill>
+          <a:ln>
+            <a:noFill/>
+          </a:ln>
+        </p:spPr>
+        <p:style>
+          <a:lnRef idx="2">
+            <a:schemeClr val="accent1">
+              <a:shade val="50000"/>
+            </a:schemeClr>
+          </a:lnRef>
+          <a:fillRef idx="1">
+            <a:schemeClr val="accent1"/>
+          </a:fillRef>
+          <a:effectRef idx="0">
+            <a:schemeClr val="accent1"/>
+          </a:effectRef>
+          <a:fontRef idx="minor">
+            <a:schemeClr val="lt1"/>
+          </a:fontRef>
+        </p:style>
+        <p:txBody>
+          <a:bodyPr rtlCol="0" anchor="ctr"/>
+          <a:lstStyle/>
+          <a:p>
+            <a:pPr algn="ctr"/>
+            <a:r>
+              <a:rPr lang="en-US" dirty="0"/>
+              <a:t> </a:t>
+            </a:r>
+          </a:p>
+        </p:txBody>
+      </p:sp>
+      <p:sp>
+        <p:nvSpPr>
+          <p:cNvPr id="17" name="Rectangle: Rounded Corners 16">
+            <a:extLst>
+              <a:ext uri="{FF2B5EF4-FFF2-40B4-BE49-F238E27FC236}">
+                <a16:creationId xmlns:a16="http://schemas.microsoft.com/office/drawing/2014/main" id="{74060652-4D13-9032-A13D-DCFC417107D2}"/>
+              </a:ext>
+            </a:extLst>
+          </p:cNvPr>
+          <p:cNvSpPr/>
+          <p:nvPr/>
+        </p:nvSpPr>
+        <p:spPr>
+          <a:xfrm>
+            <a:off x="7406753" y="2964612"/>
+            <a:ext cx="4356239" cy="3415601"/>
+          </a:xfrm>
+          <a:prstGeom prst="roundRect">
+            <a:avLst>
+              <a:gd name="adj" fmla="val 3971"/>
+            </a:avLst>
+          </a:prstGeom>
+          <a:solidFill>
+            <a:srgbClr val="F0F2F7">
+              <a:alpha val="45000"/>
+            </a:srgbClr>
+          </a:solidFill>
+          <a:ln>
+            <a:noFill/>
+          </a:ln>
+        </p:spPr>
+        <p:style>
+          <a:lnRef idx="2">
+            <a:schemeClr val="accent1">
+              <a:shade val="50000"/>
+            </a:schemeClr>
+          </a:lnRef>
+          <a:fillRef idx="1">
+            <a:schemeClr val="accent1"/>
+          </a:fillRef>
+          <a:effectRef idx="0">
+            <a:schemeClr val="accent1"/>
+          </a:effectRef>
+          <a:fontRef idx="minor">
+            <a:schemeClr val="lt1"/>
+          </a:fontRef>
+        </p:style>
+        <p:txBody>
+          <a:bodyPr rtlCol="0" anchor="ctr"/>
+          <a:lstStyle/>
+          <a:p>
+            <a:pPr algn="ctr"/>
+            <a:r>
+              <a:rPr lang="en-US" dirty="0"/>
+              <a:t> </a:t>
+            </a:r>
+          </a:p>
+        </p:txBody>
+      </p:sp>
+      <p:sp>
+        <p:nvSpPr>
+          <p:cNvPr id="19" name="Rectangle: Rounded Corners 18">
+            <a:extLst>
+              <a:ext uri="{FF2B5EF4-FFF2-40B4-BE49-F238E27FC236}">
+                <a16:creationId xmlns:a16="http://schemas.microsoft.com/office/drawing/2014/main" id="{A580AFEA-FA0E-0AC1-2B22-24E03058F64C}"/>
+              </a:ext>
+            </a:extLst>
+          </p:cNvPr>
+          <p:cNvSpPr/>
+          <p:nvPr/>
+        </p:nvSpPr>
+        <p:spPr>
+          <a:xfrm>
+            <a:off x="3191326" y="1171095"/>
+            <a:ext cx="525127" cy="433633"/>
+          </a:xfrm>
+          <a:prstGeom prst="roundRect">
+            <a:avLst/>
+          </a:prstGeom>
+          <a:solidFill>
+            <a:schemeClr val="bg1"/>
+          </a:solidFill>
+          <a:ln>
+            <a:noFill/>
+          </a:ln>
+        </p:spPr>
+        <p:style>
+          <a:lnRef idx="2">
+            <a:schemeClr val="accent1">
+              <a:shade val="50000"/>
+            </a:schemeClr>
+          </a:lnRef>
+          <a:fillRef idx="1">
+            <a:schemeClr val="accent1"/>
+          </a:fillRef>
+          <a:effectRef idx="0">
+            <a:schemeClr val="accent1"/>
+          </a:effectRef>
+          <a:fontRef idx="minor">
+            <a:schemeClr val="lt1"/>
+          </a:fontRef>
+        </p:style>
+        <p:txBody>
+          <a:bodyPr rtlCol="0" anchor="ctr"/>
+          <a:lstStyle/>
+          <a:p>
+            <a:pPr algn="ctr"/>
+            <a:endParaRPr lang="en-US"/>
+          </a:p>
+        </p:txBody>
+      </p:sp>
+      <p:sp>
+        <p:nvSpPr>
+          <p:cNvPr id="20" name="Rectangle: Rounded Corners 19">
+            <a:extLst>
+              <a:ext uri="{FF2B5EF4-FFF2-40B4-BE49-F238E27FC236}">
+                <a16:creationId xmlns:a16="http://schemas.microsoft.com/office/drawing/2014/main" id="{D1E6C6F8-86EF-FB29-CBC4-87E3855AC708}"/>
+              </a:ext>
+            </a:extLst>
+          </p:cNvPr>
+          <p:cNvSpPr/>
+          <p:nvPr/>
+        </p:nvSpPr>
+        <p:spPr>
+          <a:xfrm>
+            <a:off x="4699951" y="1171095"/>
+            <a:ext cx="525127" cy="433633"/>
+          </a:xfrm>
+          <a:prstGeom prst="roundRect">
+            <a:avLst/>
+          </a:prstGeom>
+          <a:solidFill>
+            <a:schemeClr val="bg1"/>
+          </a:solidFill>
+          <a:ln>
+            <a:noFill/>
+          </a:ln>
+        </p:spPr>
+        <p:style>
+          <a:lnRef idx="2">
+            <a:schemeClr val="accent1">
+              <a:shade val="50000"/>
+            </a:schemeClr>
+          </a:lnRef>
+          <a:fillRef idx="1">
+            <a:schemeClr val="accent1"/>
+          </a:fillRef>
+          <a:effectRef idx="0">
+            <a:schemeClr val="accent1"/>
+          </a:effectRef>
+          <a:fontRef idx="minor">
+            <a:schemeClr val="lt1"/>
+          </a:fontRef>
+        </p:style>
+        <p:txBody>
+          <a:bodyPr rtlCol="0" anchor="ctr"/>
+          <a:lstStyle/>
+          <a:p>
+            <a:pPr algn="ctr"/>
+            <a:endParaRPr lang="en-US"/>
+          </a:p>
+        </p:txBody>
+      </p:sp>
+      <p:sp>
+        <p:nvSpPr>
+          <p:cNvPr id="21" name="Rectangle: Rounded Corners 20">
+            <a:extLst>
+              <a:ext uri="{FF2B5EF4-FFF2-40B4-BE49-F238E27FC236}">
+                <a16:creationId xmlns:a16="http://schemas.microsoft.com/office/drawing/2014/main" id="{54DD339A-E83A-C3E9-B234-3DE6C07AF72E}"/>
+              </a:ext>
+            </a:extLst>
+          </p:cNvPr>
+          <p:cNvSpPr/>
+          <p:nvPr/>
+        </p:nvSpPr>
+        <p:spPr>
+          <a:xfrm>
+            <a:off x="6218268" y="1171095"/>
+            <a:ext cx="525127" cy="433633"/>
+          </a:xfrm>
+          <a:prstGeom prst="roundRect">
+            <a:avLst/>
+          </a:prstGeom>
+          <a:solidFill>
+            <a:schemeClr val="bg1"/>
+          </a:solidFill>
+          <a:ln>
+            <a:noFill/>
+          </a:ln>
+        </p:spPr>
+        <p:style>
+          <a:lnRef idx="2">
+            <a:schemeClr val="accent1">
+              <a:shade val="50000"/>
+            </a:schemeClr>
+          </a:lnRef>
+          <a:fillRef idx="1">
+            <a:schemeClr val="accent1"/>
+          </a:fillRef>
+          <a:effectRef idx="0">
+            <a:schemeClr val="accent1"/>
+          </a:effectRef>
+          <a:fontRef idx="minor">
+            <a:schemeClr val="lt1"/>
+          </a:fontRef>
+        </p:style>
+        <p:txBody>
+          <a:bodyPr rtlCol="0" anchor="ctr"/>
+          <a:lstStyle/>
+          <a:p>
+            <a:pPr algn="ctr"/>
+            <a:endParaRPr lang="en-US"/>
+          </a:p>
+        </p:txBody>
+      </p:sp>
+      <p:pic>
+        <p:nvPicPr>
+          <p:cNvPr id="29" name="Graphic 28" descr="Bar graph with downward trend with solid fill">
+            <a:extLst>
+              <a:ext uri="{FF2B5EF4-FFF2-40B4-BE49-F238E27FC236}">
+                <a16:creationId xmlns:a16="http://schemas.microsoft.com/office/drawing/2014/main" id="{92DD5F76-A1E9-EB33-4E05-596A526A8EE8}"/>
+              </a:ext>
+            </a:extLst>
+          </p:cNvPr>
+          <p:cNvPicPr>
+            <a:picLocks noChangeAspect="1"/>
+          </p:cNvPicPr>
+          <p:nvPr/>
+        </p:nvPicPr>
+        <p:blipFill>
+          <a:blip r:embed="rId2">
+            <a:duotone>
+              <a:schemeClr val="accent3">
+                <a:shade val="45000"/>
+                <a:satMod val="135000"/>
+              </a:schemeClr>
+              <a:prstClr val="white"/>
+            </a:duotone>
+            <a:extLst>
+              <a:ext uri="{28A0092B-C50C-407E-A947-70E740481C1C}">
+                <a14:useLocalDpi xmlns:a14="http://schemas.microsoft.com/office/drawing/2010/main" val="0"/>
+              </a:ext>
+              <a:ext uri="{96DAC541-7B7A-43D3-8B79-37D633B846F1}">
+                <asvg:svgBlip xmlns:asvg="http://schemas.microsoft.com/office/drawing/2016/SVG/main" r:embed="rId3"/>
+              </a:ext>
+            </a:extLst>
+          </a:blip>
+          <a:stretch>
+            <a:fillRect/>
+          </a:stretch>
+        </p:blipFill>
+        <p:spPr>
+          <a:xfrm>
+            <a:off x="4795315" y="1186463"/>
+            <a:ext cx="357256" cy="357256"/>
+          </a:xfrm>
+          <a:prstGeom prst="rect">
+            <a:avLst/>
+          </a:prstGeom>
+        </p:spPr>
+      </p:pic>
+      <p:pic>
+        <p:nvPicPr>
+          <p:cNvPr id="35" name="Graphic 34" descr="Bar graph with downward trend with solid fill">
+            <a:extLst>
+              <a:ext uri="{FF2B5EF4-FFF2-40B4-BE49-F238E27FC236}">
+                <a16:creationId xmlns:a16="http://schemas.microsoft.com/office/drawing/2014/main" id="{5368B539-EE2B-7339-C55B-5937A6D72842}"/>
+              </a:ext>
+            </a:extLst>
+          </p:cNvPr>
+          <p:cNvPicPr>
+            <a:picLocks noChangeAspect="1"/>
+          </p:cNvPicPr>
+          <p:nvPr/>
+        </p:nvPicPr>
+        <p:blipFill>
+          <a:blip r:embed="rId4">
+            <a:duotone>
+              <a:schemeClr val="accent3">
+                <a:shade val="45000"/>
+                <a:satMod val="135000"/>
+              </a:schemeClr>
+              <a:prstClr val="white"/>
+            </a:duotone>
+            <a:extLst>
+              <a:ext uri="{28A0092B-C50C-407E-A947-70E740481C1C}">
+                <a14:useLocalDpi xmlns:a14="http://schemas.microsoft.com/office/drawing/2010/main" val="0"/>
+              </a:ext>
+              <a:ext uri="{96DAC541-7B7A-43D3-8B79-37D633B846F1}">
+                <asvg:svgBlip xmlns:asvg="http://schemas.microsoft.com/office/drawing/2016/SVG/main" r:embed="rId5"/>
+              </a:ext>
+            </a:extLst>
+          </a:blip>
+          <a:stretch>
+            <a:fillRect/>
+          </a:stretch>
+        </p:blipFill>
+        <p:spPr>
+          <a:xfrm>
+            <a:off x="3262767" y="1191074"/>
+            <a:ext cx="349530" cy="349530"/>
+          </a:xfrm>
+          <a:prstGeom prst="rect">
+            <a:avLst/>
+          </a:prstGeom>
+        </p:spPr>
+      </p:pic>
+      <p:pic>
+        <p:nvPicPr>
+          <p:cNvPr id="38" name="Graphic 37" descr="Downward trend graph with solid fill">
+            <a:extLst>
+              <a:ext uri="{FF2B5EF4-FFF2-40B4-BE49-F238E27FC236}">
+                <a16:creationId xmlns:a16="http://schemas.microsoft.com/office/drawing/2014/main" id="{7C59F2FA-5E45-EF51-AF45-3D6BF6D557EE}"/>
+              </a:ext>
+            </a:extLst>
+          </p:cNvPr>
+          <p:cNvPicPr>
+            <a:picLocks noChangeAspect="1"/>
+          </p:cNvPicPr>
+          <p:nvPr/>
+        </p:nvPicPr>
+        <p:blipFill>
+          <a:blip r:embed="rId6">
+            <a:duotone>
+              <a:schemeClr val="accent3">
+                <a:shade val="45000"/>
+                <a:satMod val="135000"/>
+              </a:schemeClr>
+              <a:prstClr val="white"/>
+            </a:duotone>
+            <a:extLst>
+              <a:ext uri="{28A0092B-C50C-407E-A947-70E740481C1C}">
+                <a14:useLocalDpi xmlns:a14="http://schemas.microsoft.com/office/drawing/2010/main" val="0"/>
+              </a:ext>
+              <a:ext uri="{96DAC541-7B7A-43D3-8B79-37D633B846F1}">
+                <asvg:svgBlip xmlns:asvg="http://schemas.microsoft.com/office/drawing/2016/SVG/main" r:embed="rId7"/>
+              </a:ext>
+            </a:extLst>
+          </a:blip>
+          <a:stretch>
+            <a:fillRect/>
+          </a:stretch>
+        </p:blipFill>
+        <p:spPr>
+          <a:xfrm>
+            <a:off x="6309576" y="1154172"/>
+            <a:ext cx="386432" cy="386432"/>
+          </a:xfrm>
+          <a:prstGeom prst="rect">
+            <a:avLst/>
+          </a:prstGeom>
+        </p:spPr>
+      </p:pic>
+      <p:sp>
+        <p:nvSpPr>
+          <p:cNvPr id="40" name="Rectangle: Rounded Corners 39">
+            <a:extLst>
+              <a:ext uri="{FF2B5EF4-FFF2-40B4-BE49-F238E27FC236}">
+                <a16:creationId xmlns:a16="http://schemas.microsoft.com/office/drawing/2014/main" id="{AC48F3AC-3F92-D1A5-0422-F1CF9A251D09}"/>
+              </a:ext>
+            </a:extLst>
+          </p:cNvPr>
+          <p:cNvSpPr/>
+          <p:nvPr/>
+        </p:nvSpPr>
+        <p:spPr>
+          <a:xfrm>
+            <a:off x="442470" y="1703973"/>
+            <a:ext cx="2396701" cy="484632"/>
+          </a:xfrm>
+          <a:prstGeom prst="roundRect">
+            <a:avLst/>
+          </a:prstGeom>
+          <a:solidFill>
+            <a:schemeClr val="bg1"/>
+          </a:solidFill>
+          <a:ln>
+            <a:noFill/>
+          </a:ln>
+        </p:spPr>
+        <p:style>
+          <a:lnRef idx="2">
+            <a:schemeClr val="accent1">
+              <a:shade val="50000"/>
+            </a:schemeClr>
+          </a:lnRef>
+          <a:fillRef idx="1">
+            <a:schemeClr val="accent1"/>
+          </a:fillRef>
+          <a:effectRef idx="0">
+            <a:schemeClr val="accent1"/>
+          </a:effectRef>
+          <a:fontRef idx="minor">
+            <a:schemeClr val="lt1"/>
+          </a:fontRef>
+        </p:style>
+        <p:txBody>
+          <a:bodyPr rtlCol="0" anchor="ctr"/>
+          <a:lstStyle/>
+          <a:p>
+            <a:pPr algn="ctr"/>
+            <a:endParaRPr lang="en-US"/>
+          </a:p>
+        </p:txBody>
+      </p:sp>
+    </p:spTree>
+    <p:extLst>
+      <p:ext uri="{BB962C8B-B14F-4D97-AF65-F5344CB8AC3E}">
+        <p14:creationId xmlns:p14="http://schemas.microsoft.com/office/powerpoint/2010/main" val="3164332443"/>
       </p:ext>
     </p:extLst>
   </p:cSld>

</xml_diff>

<commit_message>
Update BI file create new Template
</commit_message>
<xml_diff>
--- a/designTemplate/DesignTemplate.pptx
+++ b/designTemplate/DesignTemplate.pptx
@@ -10,6 +10,7 @@
     <p:sldId id="258" r:id="rId4"/>
     <p:sldId id="257" r:id="rId5"/>
     <p:sldId id="260" r:id="rId6"/>
+    <p:sldId id="261" r:id="rId7"/>
   </p:sldIdLst>
   <p:sldSz cx="12192000" cy="6858000"/>
   <p:notesSz cx="6858000" cy="9144000"/>
@@ -263,7 +264,7 @@
           <a:p>
             <a:fld id="{BA414528-2103-45F8-AD7F-88AE4D6C82C2}" type="datetimeFigureOut">
               <a:rPr lang="en-US" smtClean="0"/>
-              <a:t>5/11/2023</a:t>
+              <a:t>5/12/2023</a:t>
             </a:fld>
             <a:endParaRPr lang="en-US"/>
           </a:p>
@@ -461,7 +462,7 @@
           <a:p>
             <a:fld id="{BA414528-2103-45F8-AD7F-88AE4D6C82C2}" type="datetimeFigureOut">
               <a:rPr lang="en-US" smtClean="0"/>
-              <a:t>5/11/2023</a:t>
+              <a:t>5/12/2023</a:t>
             </a:fld>
             <a:endParaRPr lang="en-US"/>
           </a:p>
@@ -669,7 +670,7 @@
           <a:p>
             <a:fld id="{BA414528-2103-45F8-AD7F-88AE4D6C82C2}" type="datetimeFigureOut">
               <a:rPr lang="en-US" smtClean="0"/>
-              <a:t>5/11/2023</a:t>
+              <a:t>5/12/2023</a:t>
             </a:fld>
             <a:endParaRPr lang="en-US"/>
           </a:p>
@@ -867,7 +868,7 @@
           <a:p>
             <a:fld id="{BA414528-2103-45F8-AD7F-88AE4D6C82C2}" type="datetimeFigureOut">
               <a:rPr lang="en-US" smtClean="0"/>
-              <a:t>5/11/2023</a:t>
+              <a:t>5/12/2023</a:t>
             </a:fld>
             <a:endParaRPr lang="en-US"/>
           </a:p>
@@ -1142,7 +1143,7 @@
           <a:p>
             <a:fld id="{BA414528-2103-45F8-AD7F-88AE4D6C82C2}" type="datetimeFigureOut">
               <a:rPr lang="en-US" smtClean="0"/>
-              <a:t>5/11/2023</a:t>
+              <a:t>5/12/2023</a:t>
             </a:fld>
             <a:endParaRPr lang="en-US"/>
           </a:p>
@@ -1407,7 +1408,7 @@
           <a:p>
             <a:fld id="{BA414528-2103-45F8-AD7F-88AE4D6C82C2}" type="datetimeFigureOut">
               <a:rPr lang="en-US" smtClean="0"/>
-              <a:t>5/11/2023</a:t>
+              <a:t>5/12/2023</a:t>
             </a:fld>
             <a:endParaRPr lang="en-US"/>
           </a:p>
@@ -1819,7 +1820,7 @@
           <a:p>
             <a:fld id="{BA414528-2103-45F8-AD7F-88AE4D6C82C2}" type="datetimeFigureOut">
               <a:rPr lang="en-US" smtClean="0"/>
-              <a:t>5/11/2023</a:t>
+              <a:t>5/12/2023</a:t>
             </a:fld>
             <a:endParaRPr lang="en-US"/>
           </a:p>
@@ -1960,7 +1961,7 @@
           <a:p>
             <a:fld id="{BA414528-2103-45F8-AD7F-88AE4D6C82C2}" type="datetimeFigureOut">
               <a:rPr lang="en-US" smtClean="0"/>
-              <a:t>5/11/2023</a:t>
+              <a:t>5/12/2023</a:t>
             </a:fld>
             <a:endParaRPr lang="en-US"/>
           </a:p>
@@ -2073,7 +2074,7 @@
           <a:p>
             <a:fld id="{BA414528-2103-45F8-AD7F-88AE4D6C82C2}" type="datetimeFigureOut">
               <a:rPr lang="en-US" smtClean="0"/>
-              <a:t>5/11/2023</a:t>
+              <a:t>5/12/2023</a:t>
             </a:fld>
             <a:endParaRPr lang="en-US"/>
           </a:p>
@@ -2384,7 +2385,7 @@
           <a:p>
             <a:fld id="{BA414528-2103-45F8-AD7F-88AE4D6C82C2}" type="datetimeFigureOut">
               <a:rPr lang="en-US" smtClean="0"/>
-              <a:t>5/11/2023</a:t>
+              <a:t>5/12/2023</a:t>
             </a:fld>
             <a:endParaRPr lang="en-US"/>
           </a:p>
@@ -2672,7 +2673,7 @@
           <a:p>
             <a:fld id="{BA414528-2103-45F8-AD7F-88AE4D6C82C2}" type="datetimeFigureOut">
               <a:rPr lang="en-US" smtClean="0"/>
-              <a:t>5/11/2023</a:t>
+              <a:t>5/12/2023</a:t>
             </a:fld>
             <a:endParaRPr lang="en-US"/>
           </a:p>
@@ -2913,7 +2914,7 @@
           <a:p>
             <a:fld id="{BA414528-2103-45F8-AD7F-88AE4D6C82C2}" type="datetimeFigureOut">
               <a:rPr lang="en-US" smtClean="0"/>
-              <a:t>5/11/2023</a:t>
+              <a:t>5/12/2023</a:t>
             </a:fld>
             <a:endParaRPr lang="en-US"/>
           </a:p>
@@ -10579,6 +10580,1106 @@
     <p:extLst>
       <p:ext uri="{BB962C8B-B14F-4D97-AF65-F5344CB8AC3E}">
         <p14:creationId xmlns:p14="http://schemas.microsoft.com/office/powerpoint/2010/main" val="3164332443"/>
+      </p:ext>
+    </p:extLst>
+  </p:cSld>
+  <p:clrMapOvr>
+    <a:masterClrMapping/>
+  </p:clrMapOvr>
+</p:sld>
+</file>
+
+<file path=ppt/slides/slide6.xml><?xml version="1.0" encoding="utf-8"?>
+<p:sld xmlns:a="http://schemas.openxmlformats.org/drawingml/2006/main" xmlns:r="http://schemas.openxmlformats.org/officeDocument/2006/relationships" xmlns:p="http://schemas.openxmlformats.org/presentationml/2006/main">
+  <p:cSld>
+    <p:bg>
+      <p:bgPr>
+        <a:solidFill>
+          <a:srgbClr val="000000"/>
+        </a:solidFill>
+        <a:effectLst/>
+      </p:bgPr>
+    </p:bg>
+    <p:spTree>
+      <p:nvGrpSpPr>
+        <p:cNvPr id="1" name=""/>
+        <p:cNvGrpSpPr/>
+        <p:nvPr/>
+      </p:nvGrpSpPr>
+      <p:grpSpPr>
+        <a:xfrm>
+          <a:off x="0" y="0"/>
+          <a:ext cx="0" cy="0"/>
+          <a:chOff x="0" y="0"/>
+          <a:chExt cx="0" cy="0"/>
+        </a:xfrm>
+      </p:grpSpPr>
+      <p:grpSp>
+        <p:nvGrpSpPr>
+          <p:cNvPr id="10" name="Group 9">
+            <a:extLst>
+              <a:ext uri="{FF2B5EF4-FFF2-40B4-BE49-F238E27FC236}">
+                <a16:creationId xmlns:a16="http://schemas.microsoft.com/office/drawing/2014/main" id="{C0A04173-1EA3-D699-C8F1-799326B1EA75}"/>
+              </a:ext>
+            </a:extLst>
+          </p:cNvPr>
+          <p:cNvGrpSpPr/>
+          <p:nvPr/>
+        </p:nvGrpSpPr>
+        <p:grpSpPr>
+          <a:xfrm>
+            <a:off x="173434" y="1287261"/>
+            <a:ext cx="2135126" cy="2550547"/>
+            <a:chOff x="764124" y="914401"/>
+            <a:chExt cx="1611430" cy="2024742"/>
+          </a:xfrm>
+        </p:grpSpPr>
+        <p:sp>
+          <p:nvSpPr>
+            <p:cNvPr id="4" name="Rectangle 3">
+              <a:extLst>
+                <a:ext uri="{FF2B5EF4-FFF2-40B4-BE49-F238E27FC236}">
+                  <a16:creationId xmlns:a16="http://schemas.microsoft.com/office/drawing/2014/main" id="{3B7A7318-64B0-0F42-CB8D-A11BCA2B8D5C}"/>
+                </a:ext>
+              </a:extLst>
+            </p:cNvPr>
+            <p:cNvSpPr/>
+            <p:nvPr/>
+          </p:nvSpPr>
+          <p:spPr>
+            <a:xfrm>
+              <a:off x="933548" y="914401"/>
+              <a:ext cx="1442006" cy="2024742"/>
+            </a:xfrm>
+            <a:prstGeom prst="rect">
+              <a:avLst/>
+            </a:prstGeom>
+            <a:solidFill>
+              <a:schemeClr val="tx1"/>
+            </a:solidFill>
+            <a:ln>
+              <a:noFill/>
+            </a:ln>
+          </p:spPr>
+          <p:style>
+            <a:lnRef idx="2">
+              <a:schemeClr val="accent1">
+                <a:shade val="50000"/>
+              </a:schemeClr>
+            </a:lnRef>
+            <a:fillRef idx="1">
+              <a:schemeClr val="accent1"/>
+            </a:fillRef>
+            <a:effectRef idx="0">
+              <a:schemeClr val="accent1"/>
+            </a:effectRef>
+            <a:fontRef idx="minor">
+              <a:schemeClr val="lt1"/>
+            </a:fontRef>
+          </p:style>
+          <p:txBody>
+            <a:bodyPr rtlCol="0" anchor="ctr"/>
+            <a:lstStyle/>
+            <a:p>
+              <a:pPr algn="ctr"/>
+              <a:endParaRPr lang="en-US"/>
+            </a:p>
+          </p:txBody>
+        </p:sp>
+        <p:sp>
+          <p:nvSpPr>
+            <p:cNvPr id="5" name="Rectangle 4">
+              <a:extLst>
+                <a:ext uri="{FF2B5EF4-FFF2-40B4-BE49-F238E27FC236}">
+                  <a16:creationId xmlns:a16="http://schemas.microsoft.com/office/drawing/2014/main" id="{A7A85B43-EBCC-CF86-7410-8042AA07BDE1}"/>
+                </a:ext>
+              </a:extLst>
+            </p:cNvPr>
+            <p:cNvSpPr/>
+            <p:nvPr/>
+          </p:nvSpPr>
+          <p:spPr>
+            <a:xfrm>
+              <a:off x="764126" y="914401"/>
+              <a:ext cx="1152144" cy="1154782"/>
+            </a:xfrm>
+            <a:prstGeom prst="rect">
+              <a:avLst/>
+            </a:prstGeom>
+            <a:solidFill>
+              <a:srgbClr val="EE0F11"/>
+            </a:solidFill>
+            <a:ln>
+              <a:noFill/>
+            </a:ln>
+          </p:spPr>
+          <p:style>
+            <a:lnRef idx="2">
+              <a:schemeClr val="accent1">
+                <a:shade val="50000"/>
+              </a:schemeClr>
+            </a:lnRef>
+            <a:fillRef idx="1">
+              <a:schemeClr val="accent1"/>
+            </a:fillRef>
+            <a:effectRef idx="0">
+              <a:schemeClr val="accent1"/>
+            </a:effectRef>
+            <a:fontRef idx="minor">
+              <a:schemeClr val="lt1"/>
+            </a:fontRef>
+          </p:style>
+          <p:txBody>
+            <a:bodyPr rtlCol="0" anchor="ctr"/>
+            <a:lstStyle/>
+            <a:p>
+              <a:pPr algn="ctr"/>
+              <a:endParaRPr lang="en-US" dirty="0"/>
+            </a:p>
+          </p:txBody>
+        </p:sp>
+        <p:sp>
+          <p:nvSpPr>
+            <p:cNvPr id="6" name="Rectangle 5">
+              <a:extLst>
+                <a:ext uri="{FF2B5EF4-FFF2-40B4-BE49-F238E27FC236}">
+                  <a16:creationId xmlns:a16="http://schemas.microsoft.com/office/drawing/2014/main" id="{92F19E77-9BF8-B470-E273-1669FBBF712F}"/>
+                </a:ext>
+              </a:extLst>
+            </p:cNvPr>
+            <p:cNvSpPr/>
+            <p:nvPr/>
+          </p:nvSpPr>
+          <p:spPr>
+            <a:xfrm>
+              <a:off x="888656" y="1028052"/>
+              <a:ext cx="1486898" cy="1154784"/>
+            </a:xfrm>
+            <a:prstGeom prst="rect">
+              <a:avLst/>
+            </a:prstGeom>
+            <a:solidFill>
+              <a:srgbClr val="191919"/>
+            </a:solidFill>
+            <a:ln>
+              <a:noFill/>
+            </a:ln>
+          </p:spPr>
+          <p:style>
+            <a:lnRef idx="2">
+              <a:schemeClr val="accent1">
+                <a:shade val="50000"/>
+              </a:schemeClr>
+            </a:lnRef>
+            <a:fillRef idx="1">
+              <a:schemeClr val="accent1"/>
+            </a:fillRef>
+            <a:effectRef idx="0">
+              <a:schemeClr val="accent1"/>
+            </a:effectRef>
+            <a:fontRef idx="minor">
+              <a:schemeClr val="lt1"/>
+            </a:fontRef>
+          </p:style>
+          <p:txBody>
+            <a:bodyPr rtlCol="0" anchor="ctr"/>
+            <a:lstStyle/>
+            <a:p>
+              <a:pPr algn="ctr"/>
+              <a:endParaRPr lang="en-US" dirty="0"/>
+            </a:p>
+          </p:txBody>
+        </p:sp>
+        <p:sp>
+          <p:nvSpPr>
+            <p:cNvPr id="7" name="Rectangle 6">
+              <a:extLst>
+                <a:ext uri="{FF2B5EF4-FFF2-40B4-BE49-F238E27FC236}">
+                  <a16:creationId xmlns:a16="http://schemas.microsoft.com/office/drawing/2014/main" id="{955C8A44-08CC-19D0-248B-672003510707}"/>
+                </a:ext>
+              </a:extLst>
+            </p:cNvPr>
+            <p:cNvSpPr/>
+            <p:nvPr/>
+          </p:nvSpPr>
+          <p:spPr>
+            <a:xfrm>
+              <a:off x="764124" y="2069182"/>
+              <a:ext cx="1611429" cy="869961"/>
+            </a:xfrm>
+            <a:prstGeom prst="rect">
+              <a:avLst/>
+            </a:prstGeom>
+            <a:solidFill>
+              <a:schemeClr val="tx1"/>
+            </a:solidFill>
+            <a:ln>
+              <a:noFill/>
+            </a:ln>
+          </p:spPr>
+          <p:style>
+            <a:lnRef idx="2">
+              <a:schemeClr val="accent1">
+                <a:shade val="50000"/>
+              </a:schemeClr>
+            </a:lnRef>
+            <a:fillRef idx="1">
+              <a:schemeClr val="accent1"/>
+            </a:fillRef>
+            <a:effectRef idx="0">
+              <a:schemeClr val="accent1"/>
+            </a:effectRef>
+            <a:fontRef idx="minor">
+              <a:schemeClr val="lt1"/>
+            </a:fontRef>
+          </p:style>
+          <p:txBody>
+            <a:bodyPr rtlCol="0" anchor="ctr"/>
+            <a:lstStyle/>
+            <a:p>
+              <a:pPr algn="ctr"/>
+              <a:endParaRPr lang="en-US"/>
+            </a:p>
+          </p:txBody>
+        </p:sp>
+        <p:sp>
+          <p:nvSpPr>
+            <p:cNvPr id="9" name="Rectangle 8">
+              <a:extLst>
+                <a:ext uri="{FF2B5EF4-FFF2-40B4-BE49-F238E27FC236}">
+                  <a16:creationId xmlns:a16="http://schemas.microsoft.com/office/drawing/2014/main" id="{96C1EF4E-21B8-F88C-A5AF-0C54EF17747E}"/>
+                </a:ext>
+              </a:extLst>
+            </p:cNvPr>
+            <p:cNvSpPr/>
+            <p:nvPr/>
+          </p:nvSpPr>
+          <p:spPr>
+            <a:xfrm>
+              <a:off x="888655" y="1028052"/>
+              <a:ext cx="1486898" cy="1911091"/>
+            </a:xfrm>
+            <a:prstGeom prst="rect">
+              <a:avLst/>
+            </a:prstGeom>
+            <a:solidFill>
+              <a:srgbClr val="191919"/>
+            </a:solidFill>
+            <a:ln>
+              <a:noFill/>
+            </a:ln>
+          </p:spPr>
+          <p:style>
+            <a:lnRef idx="2">
+              <a:schemeClr val="accent1">
+                <a:shade val="50000"/>
+              </a:schemeClr>
+            </a:lnRef>
+            <a:fillRef idx="1">
+              <a:schemeClr val="accent1"/>
+            </a:fillRef>
+            <a:effectRef idx="0">
+              <a:schemeClr val="accent1"/>
+            </a:effectRef>
+            <a:fontRef idx="minor">
+              <a:schemeClr val="lt1"/>
+            </a:fontRef>
+          </p:style>
+          <p:txBody>
+            <a:bodyPr rtlCol="0" anchor="ctr"/>
+            <a:lstStyle/>
+            <a:p>
+              <a:pPr algn="ctr"/>
+              <a:endParaRPr lang="en-US" dirty="0"/>
+            </a:p>
+          </p:txBody>
+        </p:sp>
+      </p:grpSp>
+      <p:grpSp>
+        <p:nvGrpSpPr>
+          <p:cNvPr id="17" name="Group 16">
+            <a:extLst>
+              <a:ext uri="{FF2B5EF4-FFF2-40B4-BE49-F238E27FC236}">
+                <a16:creationId xmlns:a16="http://schemas.microsoft.com/office/drawing/2014/main" id="{C6220BA2-F1D9-8269-D9FD-F82AD7817A30}"/>
+              </a:ext>
+            </a:extLst>
+          </p:cNvPr>
+          <p:cNvGrpSpPr/>
+          <p:nvPr/>
+        </p:nvGrpSpPr>
+        <p:grpSpPr>
+          <a:xfrm>
+            <a:off x="4608684" y="1296306"/>
+            <a:ext cx="2135126" cy="2550547"/>
+            <a:chOff x="764124" y="914401"/>
+            <a:chExt cx="1611430" cy="2024742"/>
+          </a:xfrm>
+        </p:grpSpPr>
+        <p:sp>
+          <p:nvSpPr>
+            <p:cNvPr id="18" name="Rectangle 17">
+              <a:extLst>
+                <a:ext uri="{FF2B5EF4-FFF2-40B4-BE49-F238E27FC236}">
+                  <a16:creationId xmlns:a16="http://schemas.microsoft.com/office/drawing/2014/main" id="{6B8F463B-BB1D-8D0C-D3C3-5B29C6895090}"/>
+                </a:ext>
+              </a:extLst>
+            </p:cNvPr>
+            <p:cNvSpPr/>
+            <p:nvPr/>
+          </p:nvSpPr>
+          <p:spPr>
+            <a:xfrm>
+              <a:off x="933548" y="914401"/>
+              <a:ext cx="1442006" cy="2024742"/>
+            </a:xfrm>
+            <a:prstGeom prst="rect">
+              <a:avLst/>
+            </a:prstGeom>
+            <a:solidFill>
+              <a:schemeClr val="tx1"/>
+            </a:solidFill>
+            <a:ln>
+              <a:noFill/>
+            </a:ln>
+          </p:spPr>
+          <p:style>
+            <a:lnRef idx="2">
+              <a:schemeClr val="accent1">
+                <a:shade val="50000"/>
+              </a:schemeClr>
+            </a:lnRef>
+            <a:fillRef idx="1">
+              <a:schemeClr val="accent1"/>
+            </a:fillRef>
+            <a:effectRef idx="0">
+              <a:schemeClr val="accent1"/>
+            </a:effectRef>
+            <a:fontRef idx="minor">
+              <a:schemeClr val="lt1"/>
+            </a:fontRef>
+          </p:style>
+          <p:txBody>
+            <a:bodyPr rtlCol="0" anchor="ctr"/>
+            <a:lstStyle/>
+            <a:p>
+              <a:pPr algn="ctr"/>
+              <a:endParaRPr lang="en-US"/>
+            </a:p>
+          </p:txBody>
+        </p:sp>
+        <p:sp>
+          <p:nvSpPr>
+            <p:cNvPr id="19" name="Rectangle 18">
+              <a:extLst>
+                <a:ext uri="{FF2B5EF4-FFF2-40B4-BE49-F238E27FC236}">
+                  <a16:creationId xmlns:a16="http://schemas.microsoft.com/office/drawing/2014/main" id="{204DB59A-1F6B-D56B-5BDD-FD5A765D6DA5}"/>
+                </a:ext>
+              </a:extLst>
+            </p:cNvPr>
+            <p:cNvSpPr/>
+            <p:nvPr/>
+          </p:nvSpPr>
+          <p:spPr>
+            <a:xfrm>
+              <a:off x="764126" y="914401"/>
+              <a:ext cx="1152144" cy="1154782"/>
+            </a:xfrm>
+            <a:prstGeom prst="rect">
+              <a:avLst/>
+            </a:prstGeom>
+            <a:solidFill>
+              <a:srgbClr val="EE0F11"/>
+            </a:solidFill>
+            <a:ln>
+              <a:noFill/>
+            </a:ln>
+          </p:spPr>
+          <p:style>
+            <a:lnRef idx="2">
+              <a:schemeClr val="accent1">
+                <a:shade val="50000"/>
+              </a:schemeClr>
+            </a:lnRef>
+            <a:fillRef idx="1">
+              <a:schemeClr val="accent1"/>
+            </a:fillRef>
+            <a:effectRef idx="0">
+              <a:schemeClr val="accent1"/>
+            </a:effectRef>
+            <a:fontRef idx="minor">
+              <a:schemeClr val="lt1"/>
+            </a:fontRef>
+          </p:style>
+          <p:txBody>
+            <a:bodyPr rtlCol="0" anchor="ctr"/>
+            <a:lstStyle/>
+            <a:p>
+              <a:pPr algn="ctr"/>
+              <a:endParaRPr lang="en-US" dirty="0"/>
+            </a:p>
+          </p:txBody>
+        </p:sp>
+        <p:sp>
+          <p:nvSpPr>
+            <p:cNvPr id="20" name="Rectangle 19">
+              <a:extLst>
+                <a:ext uri="{FF2B5EF4-FFF2-40B4-BE49-F238E27FC236}">
+                  <a16:creationId xmlns:a16="http://schemas.microsoft.com/office/drawing/2014/main" id="{B069F2EA-D171-1903-C9F2-67856D38F44A}"/>
+                </a:ext>
+              </a:extLst>
+            </p:cNvPr>
+            <p:cNvSpPr/>
+            <p:nvPr/>
+          </p:nvSpPr>
+          <p:spPr>
+            <a:xfrm>
+              <a:off x="888656" y="1028052"/>
+              <a:ext cx="1486898" cy="1154784"/>
+            </a:xfrm>
+            <a:prstGeom prst="rect">
+              <a:avLst/>
+            </a:prstGeom>
+            <a:solidFill>
+              <a:srgbClr val="191919"/>
+            </a:solidFill>
+            <a:ln>
+              <a:noFill/>
+            </a:ln>
+          </p:spPr>
+          <p:style>
+            <a:lnRef idx="2">
+              <a:schemeClr val="accent1">
+                <a:shade val="50000"/>
+              </a:schemeClr>
+            </a:lnRef>
+            <a:fillRef idx="1">
+              <a:schemeClr val="accent1"/>
+            </a:fillRef>
+            <a:effectRef idx="0">
+              <a:schemeClr val="accent1"/>
+            </a:effectRef>
+            <a:fontRef idx="minor">
+              <a:schemeClr val="lt1"/>
+            </a:fontRef>
+          </p:style>
+          <p:txBody>
+            <a:bodyPr rtlCol="0" anchor="ctr"/>
+            <a:lstStyle/>
+            <a:p>
+              <a:pPr algn="ctr"/>
+              <a:endParaRPr lang="en-US" dirty="0"/>
+            </a:p>
+          </p:txBody>
+        </p:sp>
+        <p:sp>
+          <p:nvSpPr>
+            <p:cNvPr id="21" name="Rectangle 20">
+              <a:extLst>
+                <a:ext uri="{FF2B5EF4-FFF2-40B4-BE49-F238E27FC236}">
+                  <a16:creationId xmlns:a16="http://schemas.microsoft.com/office/drawing/2014/main" id="{AC2C38BE-B892-318B-E619-401A01EB36CD}"/>
+                </a:ext>
+              </a:extLst>
+            </p:cNvPr>
+            <p:cNvSpPr/>
+            <p:nvPr/>
+          </p:nvSpPr>
+          <p:spPr>
+            <a:xfrm>
+              <a:off x="764124" y="2069182"/>
+              <a:ext cx="1611429" cy="869961"/>
+            </a:xfrm>
+            <a:prstGeom prst="rect">
+              <a:avLst/>
+            </a:prstGeom>
+            <a:solidFill>
+              <a:schemeClr val="tx1"/>
+            </a:solidFill>
+            <a:ln>
+              <a:noFill/>
+            </a:ln>
+          </p:spPr>
+          <p:style>
+            <a:lnRef idx="2">
+              <a:schemeClr val="accent1">
+                <a:shade val="50000"/>
+              </a:schemeClr>
+            </a:lnRef>
+            <a:fillRef idx="1">
+              <a:schemeClr val="accent1"/>
+            </a:fillRef>
+            <a:effectRef idx="0">
+              <a:schemeClr val="accent1"/>
+            </a:effectRef>
+            <a:fontRef idx="minor">
+              <a:schemeClr val="lt1"/>
+            </a:fontRef>
+          </p:style>
+          <p:txBody>
+            <a:bodyPr rtlCol="0" anchor="ctr"/>
+            <a:lstStyle/>
+            <a:p>
+              <a:pPr algn="ctr"/>
+              <a:endParaRPr lang="en-US"/>
+            </a:p>
+          </p:txBody>
+        </p:sp>
+        <p:sp>
+          <p:nvSpPr>
+            <p:cNvPr id="22" name="Rectangle 21">
+              <a:extLst>
+                <a:ext uri="{FF2B5EF4-FFF2-40B4-BE49-F238E27FC236}">
+                  <a16:creationId xmlns:a16="http://schemas.microsoft.com/office/drawing/2014/main" id="{8A3E7229-AB1B-054B-1DD3-197ECF7EAA2D}"/>
+                </a:ext>
+              </a:extLst>
+            </p:cNvPr>
+            <p:cNvSpPr/>
+            <p:nvPr/>
+          </p:nvSpPr>
+          <p:spPr>
+            <a:xfrm>
+              <a:off x="888655" y="1028052"/>
+              <a:ext cx="1486898" cy="1911091"/>
+            </a:xfrm>
+            <a:prstGeom prst="rect">
+              <a:avLst/>
+            </a:prstGeom>
+            <a:solidFill>
+              <a:srgbClr val="191919"/>
+            </a:solidFill>
+            <a:ln>
+              <a:noFill/>
+            </a:ln>
+          </p:spPr>
+          <p:style>
+            <a:lnRef idx="2">
+              <a:schemeClr val="accent1">
+                <a:shade val="50000"/>
+              </a:schemeClr>
+            </a:lnRef>
+            <a:fillRef idx="1">
+              <a:schemeClr val="accent1"/>
+            </a:fillRef>
+            <a:effectRef idx="0">
+              <a:schemeClr val="accent1"/>
+            </a:effectRef>
+            <a:fontRef idx="minor">
+              <a:schemeClr val="lt1"/>
+            </a:fontRef>
+          </p:style>
+          <p:txBody>
+            <a:bodyPr rtlCol="0" anchor="ctr"/>
+            <a:lstStyle/>
+            <a:p>
+              <a:pPr algn="ctr"/>
+              <a:endParaRPr lang="en-US" dirty="0"/>
+            </a:p>
+          </p:txBody>
+        </p:sp>
+      </p:grpSp>
+      <p:sp>
+        <p:nvSpPr>
+          <p:cNvPr id="23" name="Rectangle 22">
+            <a:extLst>
+              <a:ext uri="{FF2B5EF4-FFF2-40B4-BE49-F238E27FC236}">
+                <a16:creationId xmlns:a16="http://schemas.microsoft.com/office/drawing/2014/main" id="{27FDECA3-2A66-796A-F8DE-365B4F735204}"/>
+              </a:ext>
+            </a:extLst>
+          </p:cNvPr>
+          <p:cNvSpPr/>
+          <p:nvPr/>
+        </p:nvSpPr>
+        <p:spPr>
+          <a:xfrm>
+            <a:off x="2473561" y="1439471"/>
+            <a:ext cx="1970122" cy="2407382"/>
+          </a:xfrm>
+          <a:prstGeom prst="rect">
+            <a:avLst/>
+          </a:prstGeom>
+          <a:solidFill>
+            <a:srgbClr val="191919"/>
+          </a:solidFill>
+          <a:ln>
+            <a:noFill/>
+          </a:ln>
+        </p:spPr>
+        <p:style>
+          <a:lnRef idx="2">
+            <a:schemeClr val="accent1">
+              <a:shade val="50000"/>
+            </a:schemeClr>
+          </a:lnRef>
+          <a:fillRef idx="1">
+            <a:schemeClr val="accent1"/>
+          </a:fillRef>
+          <a:effectRef idx="0">
+            <a:schemeClr val="accent1"/>
+          </a:effectRef>
+          <a:fontRef idx="minor">
+            <a:schemeClr val="lt1"/>
+          </a:fontRef>
+        </p:style>
+        <p:txBody>
+          <a:bodyPr rtlCol="0" anchor="ctr"/>
+          <a:lstStyle/>
+          <a:p>
+            <a:pPr algn="ctr"/>
+            <a:endParaRPr lang="en-US"/>
+          </a:p>
+        </p:txBody>
+      </p:sp>
+      <p:sp>
+        <p:nvSpPr>
+          <p:cNvPr id="24" name="Rectangle: Rounded Corners 23">
+            <a:extLst>
+              <a:ext uri="{FF2B5EF4-FFF2-40B4-BE49-F238E27FC236}">
+                <a16:creationId xmlns:a16="http://schemas.microsoft.com/office/drawing/2014/main" id="{5F45A5DE-9C80-6638-6931-47A19E2827C6}"/>
+              </a:ext>
+            </a:extLst>
+          </p:cNvPr>
+          <p:cNvSpPr/>
+          <p:nvPr/>
+        </p:nvSpPr>
+        <p:spPr>
+          <a:xfrm>
+            <a:off x="173434" y="202125"/>
+            <a:ext cx="1201258" cy="303365"/>
+          </a:xfrm>
+          <a:prstGeom prst="roundRect">
+            <a:avLst/>
+          </a:prstGeom>
+          <a:solidFill>
+            <a:srgbClr val="EE0F11">
+              <a:alpha val="60000"/>
+            </a:srgbClr>
+          </a:solidFill>
+          <a:ln>
+            <a:noFill/>
+          </a:ln>
+        </p:spPr>
+        <p:style>
+          <a:lnRef idx="2">
+            <a:schemeClr val="accent1">
+              <a:shade val="50000"/>
+            </a:schemeClr>
+          </a:lnRef>
+          <a:fillRef idx="1">
+            <a:schemeClr val="accent1"/>
+          </a:fillRef>
+          <a:effectRef idx="0">
+            <a:schemeClr val="accent1"/>
+          </a:effectRef>
+          <a:fontRef idx="minor">
+            <a:schemeClr val="lt1"/>
+          </a:fontRef>
+        </p:style>
+        <p:txBody>
+          <a:bodyPr rtlCol="0" anchor="ctr"/>
+          <a:lstStyle/>
+          <a:p>
+            <a:pPr algn="ctr"/>
+            <a:endParaRPr lang="en-US"/>
+          </a:p>
+        </p:txBody>
+      </p:sp>
+      <p:sp>
+        <p:nvSpPr>
+          <p:cNvPr id="25" name="Rectangle: Rounded Corners 24">
+            <a:extLst>
+              <a:ext uri="{FF2B5EF4-FFF2-40B4-BE49-F238E27FC236}">
+                <a16:creationId xmlns:a16="http://schemas.microsoft.com/office/drawing/2014/main" id="{D2761A91-B977-A232-0B9B-FA5659F8D9C2}"/>
+              </a:ext>
+            </a:extLst>
+          </p:cNvPr>
+          <p:cNvSpPr/>
+          <p:nvPr/>
+        </p:nvSpPr>
+        <p:spPr>
+          <a:xfrm>
+            <a:off x="1827004" y="202125"/>
+            <a:ext cx="1201258" cy="303365"/>
+          </a:xfrm>
+          <a:prstGeom prst="roundRect">
+            <a:avLst/>
+          </a:prstGeom>
+          <a:solidFill>
+            <a:srgbClr val="191919"/>
+          </a:solidFill>
+          <a:ln>
+            <a:noFill/>
+          </a:ln>
+        </p:spPr>
+        <p:style>
+          <a:lnRef idx="2">
+            <a:schemeClr val="accent1">
+              <a:shade val="50000"/>
+            </a:schemeClr>
+          </a:lnRef>
+          <a:fillRef idx="1">
+            <a:schemeClr val="accent1"/>
+          </a:fillRef>
+          <a:effectRef idx="0">
+            <a:schemeClr val="accent1"/>
+          </a:effectRef>
+          <a:fontRef idx="minor">
+            <a:schemeClr val="lt1"/>
+          </a:fontRef>
+        </p:style>
+        <p:txBody>
+          <a:bodyPr rtlCol="0" anchor="ctr"/>
+          <a:lstStyle/>
+          <a:p>
+            <a:pPr algn="ctr"/>
+            <a:endParaRPr lang="en-US"/>
+          </a:p>
+        </p:txBody>
+      </p:sp>
+      <p:sp>
+        <p:nvSpPr>
+          <p:cNvPr id="26" name="Rectangle: Rounded Corners 25">
+            <a:extLst>
+              <a:ext uri="{FF2B5EF4-FFF2-40B4-BE49-F238E27FC236}">
+                <a16:creationId xmlns:a16="http://schemas.microsoft.com/office/drawing/2014/main" id="{F70CDD73-C263-61EC-52D8-24B19472377B}"/>
+              </a:ext>
+            </a:extLst>
+          </p:cNvPr>
+          <p:cNvSpPr/>
+          <p:nvPr/>
+        </p:nvSpPr>
+        <p:spPr>
+          <a:xfrm>
+            <a:off x="3480574" y="202125"/>
+            <a:ext cx="1201258" cy="303365"/>
+          </a:xfrm>
+          <a:prstGeom prst="roundRect">
+            <a:avLst/>
+          </a:prstGeom>
+          <a:solidFill>
+            <a:srgbClr val="191919"/>
+          </a:solidFill>
+          <a:ln>
+            <a:noFill/>
+          </a:ln>
+        </p:spPr>
+        <p:style>
+          <a:lnRef idx="2">
+            <a:schemeClr val="accent1">
+              <a:shade val="50000"/>
+            </a:schemeClr>
+          </a:lnRef>
+          <a:fillRef idx="1">
+            <a:schemeClr val="accent1"/>
+          </a:fillRef>
+          <a:effectRef idx="0">
+            <a:schemeClr val="accent1"/>
+          </a:effectRef>
+          <a:fontRef idx="minor">
+            <a:schemeClr val="lt1"/>
+          </a:fontRef>
+        </p:style>
+        <p:txBody>
+          <a:bodyPr rtlCol="0" anchor="ctr"/>
+          <a:lstStyle/>
+          <a:p>
+            <a:pPr algn="ctr"/>
+            <a:endParaRPr lang="en-US"/>
+          </a:p>
+        </p:txBody>
+      </p:sp>
+      <p:sp>
+        <p:nvSpPr>
+          <p:cNvPr id="27" name="Rectangle: Rounded Corners 26">
+            <a:extLst>
+              <a:ext uri="{FF2B5EF4-FFF2-40B4-BE49-F238E27FC236}">
+                <a16:creationId xmlns:a16="http://schemas.microsoft.com/office/drawing/2014/main" id="{4ED3AE7B-0BC2-D36F-DE95-B5E59D829021}"/>
+              </a:ext>
+            </a:extLst>
+          </p:cNvPr>
+          <p:cNvSpPr/>
+          <p:nvPr/>
+        </p:nvSpPr>
+        <p:spPr>
+          <a:xfrm>
+            <a:off x="5134145" y="202125"/>
+            <a:ext cx="1201258" cy="303365"/>
+          </a:xfrm>
+          <a:prstGeom prst="roundRect">
+            <a:avLst/>
+          </a:prstGeom>
+          <a:solidFill>
+            <a:srgbClr val="191919"/>
+          </a:solidFill>
+          <a:ln>
+            <a:noFill/>
+          </a:ln>
+        </p:spPr>
+        <p:style>
+          <a:lnRef idx="2">
+            <a:schemeClr val="accent1">
+              <a:shade val="50000"/>
+            </a:schemeClr>
+          </a:lnRef>
+          <a:fillRef idx="1">
+            <a:schemeClr val="accent1"/>
+          </a:fillRef>
+          <a:effectRef idx="0">
+            <a:schemeClr val="accent1"/>
+          </a:effectRef>
+          <a:fontRef idx="minor">
+            <a:schemeClr val="lt1"/>
+          </a:fontRef>
+        </p:style>
+        <p:txBody>
+          <a:bodyPr rtlCol="0" anchor="ctr"/>
+          <a:lstStyle/>
+          <a:p>
+            <a:pPr algn="ctr"/>
+            <a:endParaRPr lang="en-US"/>
+          </a:p>
+        </p:txBody>
+      </p:sp>
+      <p:pic>
+        <p:nvPicPr>
+          <p:cNvPr id="29" name="Picture 28">
+            <a:extLst>
+              <a:ext uri="{FF2B5EF4-FFF2-40B4-BE49-F238E27FC236}">
+                <a16:creationId xmlns:a16="http://schemas.microsoft.com/office/drawing/2014/main" id="{850F4441-CC20-4860-4056-BABBDD67CB46}"/>
+              </a:ext>
+            </a:extLst>
+          </p:cNvPr>
+          <p:cNvPicPr>
+            <a:picLocks noChangeAspect="1"/>
+          </p:cNvPicPr>
+          <p:nvPr/>
+        </p:nvPicPr>
+        <p:blipFill>
+          <a:blip r:embed="rId2">
+            <a:extLst>
+              <a:ext uri="{28A0092B-C50C-407E-A947-70E740481C1C}">
+                <a14:useLocalDpi xmlns:a14="http://schemas.microsoft.com/office/drawing/2010/main" val="0"/>
+              </a:ext>
+            </a:extLst>
+          </a:blip>
+          <a:stretch>
+            <a:fillRect/>
+          </a:stretch>
+        </p:blipFill>
+        <p:spPr>
+          <a:xfrm>
+            <a:off x="7466350" y="-2888"/>
+            <a:ext cx="4725650" cy="3079463"/>
+          </a:xfrm>
+          <a:prstGeom prst="rect">
+            <a:avLst/>
+          </a:prstGeom>
+        </p:spPr>
+      </p:pic>
+      <p:pic>
+        <p:nvPicPr>
+          <p:cNvPr id="31" name="Picture 30">
+            <a:extLst>
+              <a:ext uri="{FF2B5EF4-FFF2-40B4-BE49-F238E27FC236}">
+                <a16:creationId xmlns:a16="http://schemas.microsoft.com/office/drawing/2014/main" id="{6E9AEA68-5598-3356-9040-1936F8E7D763}"/>
+              </a:ext>
+            </a:extLst>
+          </p:cNvPr>
+          <p:cNvPicPr>
+            <a:picLocks noChangeAspect="1"/>
+          </p:cNvPicPr>
+          <p:nvPr/>
+        </p:nvPicPr>
+        <p:blipFill>
+          <a:blip r:embed="rId3">
+            <a:extLst>
+              <a:ext uri="{28A0092B-C50C-407E-A947-70E740481C1C}">
+                <a14:useLocalDpi xmlns:a14="http://schemas.microsoft.com/office/drawing/2010/main" val="0"/>
+              </a:ext>
+            </a:extLst>
+          </a:blip>
+          <a:stretch>
+            <a:fillRect/>
+          </a:stretch>
+        </p:blipFill>
+        <p:spPr>
+          <a:xfrm>
+            <a:off x="8859030" y="5700006"/>
+            <a:ext cx="3200400" cy="952500"/>
+          </a:xfrm>
+          <a:prstGeom prst="rect">
+            <a:avLst/>
+          </a:prstGeom>
+        </p:spPr>
+      </p:pic>
+      <p:sp>
+        <p:nvSpPr>
+          <p:cNvPr id="32" name="Rectangle: Rounded Corners 31">
+            <a:extLst>
+              <a:ext uri="{FF2B5EF4-FFF2-40B4-BE49-F238E27FC236}">
+                <a16:creationId xmlns:a16="http://schemas.microsoft.com/office/drawing/2014/main" id="{82FF07E3-2926-177E-740A-C30195CD519B}"/>
+              </a:ext>
+            </a:extLst>
+          </p:cNvPr>
+          <p:cNvSpPr/>
+          <p:nvPr/>
+        </p:nvSpPr>
+        <p:spPr>
+          <a:xfrm>
+            <a:off x="5217232" y="4969765"/>
+            <a:ext cx="1526577" cy="339716"/>
+          </a:xfrm>
+          <a:prstGeom prst="roundRect">
+            <a:avLst/>
+          </a:prstGeom>
+          <a:solidFill>
+            <a:srgbClr val="EE0F11">
+              <a:alpha val="85000"/>
+            </a:srgbClr>
+          </a:solidFill>
+          <a:ln>
+            <a:noFill/>
+          </a:ln>
+        </p:spPr>
+        <p:style>
+          <a:lnRef idx="2">
+            <a:schemeClr val="accent1">
+              <a:shade val="50000"/>
+            </a:schemeClr>
+          </a:lnRef>
+          <a:fillRef idx="1">
+            <a:schemeClr val="accent1"/>
+          </a:fillRef>
+          <a:effectRef idx="0">
+            <a:schemeClr val="accent1"/>
+          </a:effectRef>
+          <a:fontRef idx="minor">
+            <a:schemeClr val="lt1"/>
+          </a:fontRef>
+        </p:style>
+        <p:txBody>
+          <a:bodyPr rtlCol="0" anchor="ctr"/>
+          <a:lstStyle/>
+          <a:p>
+            <a:pPr algn="ctr"/>
+            <a:endParaRPr lang="en-US"/>
+          </a:p>
+        </p:txBody>
+      </p:sp>
+      <p:sp>
+        <p:nvSpPr>
+          <p:cNvPr id="33" name="Rectangle: Rounded Corners 32">
+            <a:extLst>
+              <a:ext uri="{FF2B5EF4-FFF2-40B4-BE49-F238E27FC236}">
+                <a16:creationId xmlns:a16="http://schemas.microsoft.com/office/drawing/2014/main" id="{37E56591-8A32-3279-7649-5C4DF180DB03}"/>
+              </a:ext>
+            </a:extLst>
+          </p:cNvPr>
+          <p:cNvSpPr/>
+          <p:nvPr/>
+        </p:nvSpPr>
+        <p:spPr>
+          <a:xfrm>
+            <a:off x="2695334" y="3657943"/>
+            <a:ext cx="1526577" cy="339716"/>
+          </a:xfrm>
+          <a:prstGeom prst="roundRect">
+            <a:avLst/>
+          </a:prstGeom>
+          <a:solidFill>
+            <a:schemeClr val="tx1">
+              <a:alpha val="85000"/>
+            </a:schemeClr>
+          </a:solidFill>
+          <a:ln w="12700">
+            <a:solidFill>
+              <a:srgbClr val="EE0F11"/>
+            </a:solidFill>
+          </a:ln>
+        </p:spPr>
+        <p:style>
+          <a:lnRef idx="2">
+            <a:schemeClr val="accent1">
+              <a:shade val="50000"/>
+            </a:schemeClr>
+          </a:lnRef>
+          <a:fillRef idx="1">
+            <a:schemeClr val="accent1"/>
+          </a:fillRef>
+          <a:effectRef idx="0">
+            <a:schemeClr val="accent1"/>
+          </a:effectRef>
+          <a:fontRef idx="minor">
+            <a:schemeClr val="lt1"/>
+          </a:fontRef>
+        </p:style>
+        <p:txBody>
+          <a:bodyPr rtlCol="0" anchor="ctr"/>
+          <a:lstStyle/>
+          <a:p>
+            <a:pPr algn="ctr"/>
+            <a:endParaRPr lang="en-US"/>
+          </a:p>
+        </p:txBody>
+      </p:sp>
+      <p:sp>
+        <p:nvSpPr>
+          <p:cNvPr id="34" name="Rectangle: Rounded Corners 33">
+            <a:extLst>
+              <a:ext uri="{FF2B5EF4-FFF2-40B4-BE49-F238E27FC236}">
+                <a16:creationId xmlns:a16="http://schemas.microsoft.com/office/drawing/2014/main" id="{6481D63F-896C-CA03-6AB0-EFBA6777868C}"/>
+              </a:ext>
+            </a:extLst>
+          </p:cNvPr>
+          <p:cNvSpPr/>
+          <p:nvPr/>
+        </p:nvSpPr>
+        <p:spPr>
+          <a:xfrm>
+            <a:off x="4977550" y="3667473"/>
+            <a:ext cx="1526577" cy="339716"/>
+          </a:xfrm>
+          <a:prstGeom prst="roundRect">
+            <a:avLst/>
+          </a:prstGeom>
+          <a:solidFill>
+            <a:schemeClr val="tx1">
+              <a:alpha val="85000"/>
+            </a:schemeClr>
+          </a:solidFill>
+          <a:ln w="12700">
+            <a:solidFill>
+              <a:srgbClr val="EE0F11"/>
+            </a:solidFill>
+          </a:ln>
+        </p:spPr>
+        <p:style>
+          <a:lnRef idx="2">
+            <a:schemeClr val="accent1">
+              <a:shade val="50000"/>
+            </a:schemeClr>
+          </a:lnRef>
+          <a:fillRef idx="1">
+            <a:schemeClr val="accent1"/>
+          </a:fillRef>
+          <a:effectRef idx="0">
+            <a:schemeClr val="accent1"/>
+          </a:effectRef>
+          <a:fontRef idx="minor">
+            <a:schemeClr val="lt1"/>
+          </a:fontRef>
+        </p:style>
+        <p:txBody>
+          <a:bodyPr rtlCol="0" anchor="ctr"/>
+          <a:lstStyle/>
+          <a:p>
+            <a:pPr algn="ctr"/>
+            <a:endParaRPr lang="en-US"/>
+          </a:p>
+        </p:txBody>
+      </p:sp>
+    </p:spTree>
+    <p:extLst>
+      <p:ext uri="{BB962C8B-B14F-4D97-AF65-F5344CB8AC3E}">
+        <p14:creationId xmlns:p14="http://schemas.microsoft.com/office/powerpoint/2010/main" val="4199116932"/>
       </p:ext>
     </p:extLst>
   </p:cSld>

</xml_diff>